<commit_message>
messed up visregs.R and made a new ppt file with figs and notes
</commit_message>
<xml_diff>
--- a/docs/manuscripts/euc manuscript/figs/euc_MS_figure_panels_JL_27-06-17.pptx
+++ b/docs/manuscripts/euc manuscript/figs/euc_MS_figure_panels_JL_27-06-17.pptx
@@ -9,7 +9,7 @@
   </p:notesMasterIdLst>
   <p:sldIdLst>
     <p:sldId id="281" r:id="rId2"/>
-    <p:sldId id="282" r:id="rId3"/>
+    <p:sldId id="286" r:id="rId3"/>
     <p:sldId id="283" r:id="rId4"/>
     <p:sldId id="284" r:id="rId5"/>
     <p:sldId id="276" r:id="rId6"/>
@@ -206,7 +206,7 @@
           <a:p>
             <a:fld id="{36C24D47-6580-4785-9462-CADD8599AFB8}" type="datetimeFigureOut">
               <a:rPr lang="en-AU" smtClean="0"/>
-              <a:t>27/06/2017</a:t>
+              <a:t>3/07/2017</a:t>
             </a:fld>
             <a:endParaRPr lang="en-AU"/>
           </a:p>
@@ -1376,7 +1376,7 @@
     </p:spTree>
     <p:extLst>
       <p:ext uri="{BB962C8B-B14F-4D97-AF65-F5344CB8AC3E}">
-        <p14:creationId xmlns:p14="http://schemas.microsoft.com/office/powerpoint/2010/main" val="3348613779"/>
+        <p14:creationId xmlns:p14="http://schemas.microsoft.com/office/powerpoint/2010/main" val="1124260314"/>
       </p:ext>
     </p:extLst>
   </p:cSld>
@@ -2668,7 +2668,7 @@
           <a:p>
             <a:fld id="{DBF67EF4-3E3F-41D9-AB59-178FFA85FB21}" type="datetimeFigureOut">
               <a:rPr lang="en-AU" smtClean="0"/>
-              <a:t>27/06/2017</a:t>
+              <a:t>3/07/2017</a:t>
             </a:fld>
             <a:endParaRPr lang="en-AU"/>
           </a:p>
@@ -2838,7 +2838,7 @@
           <a:p>
             <a:fld id="{DBF67EF4-3E3F-41D9-AB59-178FFA85FB21}" type="datetimeFigureOut">
               <a:rPr lang="en-AU" smtClean="0"/>
-              <a:t>27/06/2017</a:t>
+              <a:t>3/07/2017</a:t>
             </a:fld>
             <a:endParaRPr lang="en-AU"/>
           </a:p>
@@ -3018,7 +3018,7 @@
           <a:p>
             <a:fld id="{DBF67EF4-3E3F-41D9-AB59-178FFA85FB21}" type="datetimeFigureOut">
               <a:rPr lang="en-AU" smtClean="0"/>
-              <a:t>27/06/2017</a:t>
+              <a:t>3/07/2017</a:t>
             </a:fld>
             <a:endParaRPr lang="en-AU"/>
           </a:p>
@@ -3188,7 +3188,7 @@
           <a:p>
             <a:fld id="{DBF67EF4-3E3F-41D9-AB59-178FFA85FB21}" type="datetimeFigureOut">
               <a:rPr lang="en-AU" smtClean="0"/>
-              <a:t>27/06/2017</a:t>
+              <a:t>3/07/2017</a:t>
             </a:fld>
             <a:endParaRPr lang="en-AU"/>
           </a:p>
@@ -3432,7 +3432,7 @@
           <a:p>
             <a:fld id="{DBF67EF4-3E3F-41D9-AB59-178FFA85FB21}" type="datetimeFigureOut">
               <a:rPr lang="en-AU" smtClean="0"/>
-              <a:t>27/06/2017</a:t>
+              <a:t>3/07/2017</a:t>
             </a:fld>
             <a:endParaRPr lang="en-AU"/>
           </a:p>
@@ -3664,7 +3664,7 @@
           <a:p>
             <a:fld id="{DBF67EF4-3E3F-41D9-AB59-178FFA85FB21}" type="datetimeFigureOut">
               <a:rPr lang="en-AU" smtClean="0"/>
-              <a:t>27/06/2017</a:t>
+              <a:t>3/07/2017</a:t>
             </a:fld>
             <a:endParaRPr lang="en-AU"/>
           </a:p>
@@ -4031,7 +4031,7 @@
           <a:p>
             <a:fld id="{DBF67EF4-3E3F-41D9-AB59-178FFA85FB21}" type="datetimeFigureOut">
               <a:rPr lang="en-AU" smtClean="0"/>
-              <a:t>27/06/2017</a:t>
+              <a:t>3/07/2017</a:t>
             </a:fld>
             <a:endParaRPr lang="en-AU"/>
           </a:p>
@@ -4149,7 +4149,7 @@
           <a:p>
             <a:fld id="{DBF67EF4-3E3F-41D9-AB59-178FFA85FB21}" type="datetimeFigureOut">
               <a:rPr lang="en-AU" smtClean="0"/>
-              <a:t>27/06/2017</a:t>
+              <a:t>3/07/2017</a:t>
             </a:fld>
             <a:endParaRPr lang="en-AU"/>
           </a:p>
@@ -4244,7 +4244,7 @@
           <a:p>
             <a:fld id="{DBF67EF4-3E3F-41D9-AB59-178FFA85FB21}" type="datetimeFigureOut">
               <a:rPr lang="en-AU" smtClean="0"/>
-              <a:t>27/06/2017</a:t>
+              <a:t>3/07/2017</a:t>
             </a:fld>
             <a:endParaRPr lang="en-AU"/>
           </a:p>
@@ -4521,7 +4521,7 @@
           <a:p>
             <a:fld id="{DBF67EF4-3E3F-41D9-AB59-178FFA85FB21}" type="datetimeFigureOut">
               <a:rPr lang="en-AU" smtClean="0"/>
-              <a:t>27/06/2017</a:t>
+              <a:t>3/07/2017</a:t>
             </a:fld>
             <a:endParaRPr lang="en-AU"/>
           </a:p>
@@ -4778,7 +4778,7 @@
           <a:p>
             <a:fld id="{DBF67EF4-3E3F-41D9-AB59-178FFA85FB21}" type="datetimeFigureOut">
               <a:rPr lang="en-AU" smtClean="0"/>
-              <a:t>27/06/2017</a:t>
+              <a:t>3/07/2017</a:t>
             </a:fld>
             <a:endParaRPr lang="en-AU"/>
           </a:p>
@@ -4991,7 +4991,7 @@
           <a:p>
             <a:fld id="{DBF67EF4-3E3F-41D9-AB59-178FFA85FB21}" type="datetimeFigureOut">
               <a:rPr lang="en-AU" smtClean="0"/>
-              <a:t>27/06/2017</a:t>
+              <a:t>3/07/2017</a:t>
             </a:fld>
             <a:endParaRPr lang="en-AU"/>
           </a:p>
@@ -5401,7 +5401,7 @@
           <p:cNvPr id="20" name="TextBox 19">
             <a:extLst>
               <a:ext uri="{FF2B5EF4-FFF2-40B4-BE49-F238E27FC236}">
-                <a16:creationId xmlns:a16="http://schemas.microsoft.com/office/drawing/2014/main" xmlns="" id="{036694F8-822A-4EA9-A83F-BB11CF14A3AC}"/>
+                <a16:creationId xmlns="" xmlns:a16="http://schemas.microsoft.com/office/drawing/2014/main" id="{036694F8-822A-4EA9-A83F-BB11CF14A3AC}"/>
               </a:ext>
             </a:extLst>
           </p:cNvPr>
@@ -5537,8 +5537,8 @@
           </p:nvSpPr>
           <p:spPr>
             <a:xfrm>
-              <a:off x="2713632" y="3962399"/>
-              <a:ext cx="482597" cy="277169"/>
+              <a:off x="2713631" y="3962399"/>
+              <a:ext cx="1022034" cy="422727"/>
             </a:xfrm>
             <a:prstGeom prst="rect">
               <a:avLst/>
@@ -5567,7 +5567,7 @@
           <p:spPr>
             <a:xfrm>
               <a:off x="2459940" y="3795264"/>
-              <a:ext cx="1405571" cy="657693"/>
+              <a:ext cx="2199041" cy="422727"/>
             </a:xfrm>
             <a:prstGeom prst="rect">
               <a:avLst/>
@@ -5623,7 +5623,7 @@
           <p:cNvPr id="13" name="Group 12">
             <a:extLst>
               <a:ext uri="{FF2B5EF4-FFF2-40B4-BE49-F238E27FC236}">
-                <a16:creationId xmlns:a16="http://schemas.microsoft.com/office/drawing/2014/main" xmlns="" id="{C9FFF9FF-C604-459E-BA51-CAAD744824C9}"/>
+                <a16:creationId xmlns="" xmlns:a16="http://schemas.microsoft.com/office/drawing/2014/main" id="{C9FFF9FF-C604-459E-BA51-CAAD744824C9}"/>
               </a:ext>
             </a:extLst>
           </p:cNvPr>
@@ -5643,7 +5643,7 @@
             <p:cNvPr id="14" name="Picture 13" descr="abundance_rank_90pc.png">
               <a:extLst>
                 <a:ext uri="{FF2B5EF4-FFF2-40B4-BE49-F238E27FC236}">
-                  <a16:creationId xmlns:a16="http://schemas.microsoft.com/office/drawing/2014/main" xmlns="" id="{34BBFF6D-3CCF-4CB2-B743-963595FCD805}"/>
+                  <a16:creationId xmlns="" xmlns:a16="http://schemas.microsoft.com/office/drawing/2014/main" id="{34BBFF6D-3CCF-4CB2-B743-963595FCD805}"/>
                 </a:ext>
               </a:extLst>
             </p:cNvPr>
@@ -5679,7 +5679,7 @@
             <p:cNvPr id="15" name="TextBox 14">
               <a:extLst>
                 <a:ext uri="{FF2B5EF4-FFF2-40B4-BE49-F238E27FC236}">
-                  <a16:creationId xmlns:a16="http://schemas.microsoft.com/office/drawing/2014/main" xmlns="" id="{589E7152-499C-44E8-BA29-4777970B8AAA}"/>
+                  <a16:creationId xmlns="" xmlns:a16="http://schemas.microsoft.com/office/drawing/2014/main" id="{589E7152-499C-44E8-BA29-4777970B8AAA}"/>
                 </a:ext>
               </a:extLst>
             </p:cNvPr>
@@ -5801,8 +5801,8 @@
         </p:nvGrpSpPr>
         <p:grpSpPr>
           <a:xfrm>
-            <a:off x="-40216" y="2442973"/>
-            <a:ext cx="5628086" cy="4576108"/>
+            <a:off x="-216980" y="1302147"/>
+            <a:ext cx="6922658" cy="5303173"/>
             <a:chOff x="-181204" y="2712895"/>
             <a:chExt cx="4618017" cy="3935116"/>
           </a:xfrm>
@@ -5842,7 +5842,7 @@
             <p:cNvPr id="20" name="TextBox 19">
               <a:extLst>
                 <a:ext uri="{FF2B5EF4-FFF2-40B4-BE49-F238E27FC236}">
-                  <a16:creationId xmlns:a16="http://schemas.microsoft.com/office/drawing/2014/main" xmlns="" id="{036694F8-822A-4EA9-A83F-BB11CF14A3AC}"/>
+                  <a16:creationId xmlns="" xmlns:a16="http://schemas.microsoft.com/office/drawing/2014/main" id="{036694F8-822A-4EA9-A83F-BB11CF14A3AC}"/>
                 </a:ext>
               </a:extLst>
             </p:cNvPr>
@@ -5875,36 +5875,42 @@
       </p:grpSp>
       <p:grpSp>
         <p:nvGrpSpPr>
-          <p:cNvPr id="77" name="Group 76"/>
+          <p:cNvPr id="52" name="Group 51"/>
           <p:cNvGrpSpPr/>
           <p:nvPr/>
         </p:nvGrpSpPr>
         <p:grpSpPr>
           <a:xfrm>
-            <a:off x="5622156" y="7024471"/>
-            <a:ext cx="3833662" cy="3298326"/>
-            <a:chOff x="5588938" y="6923208"/>
-            <a:chExt cx="3833662" cy="3298326"/>
+            <a:off x="325538" y="6677587"/>
+            <a:ext cx="5095184" cy="3246518"/>
+            <a:chOff x="91676" y="8847134"/>
+            <a:chExt cx="5095184" cy="3246518"/>
           </a:xfrm>
         </p:grpSpPr>
         <p:pic>
           <p:nvPicPr>
-            <p:cNvPr id="36" name="Picture 35"/>
+            <p:cNvPr id="55" name="Picture 54"/>
             <p:cNvPicPr>
               <a:picLocks noChangeAspect="1"/>
             </p:cNvPicPr>
             <p:nvPr/>
           </p:nvPicPr>
           <p:blipFill>
-            <a:blip r:embed="rId4"/>
+            <a:blip r:embed="rId4" cstate="print">
+              <a:extLst>
+                <a:ext uri="{28A0092B-C50C-407E-A947-70E740481C1C}">
+                  <a14:useLocalDpi xmlns:a14="http://schemas.microsoft.com/office/drawing/2010/main" val="0"/>
+                </a:ext>
+              </a:extLst>
+            </a:blip>
             <a:stretch>
               <a:fillRect/>
             </a:stretch>
           </p:blipFill>
           <p:spPr>
             <a:xfrm>
-              <a:off x="5740354" y="7214861"/>
-              <a:ext cx="1867948" cy="1546751"/>
+              <a:off x="91676" y="9004978"/>
+              <a:ext cx="1697164" cy="1501981"/>
             </a:xfrm>
             <a:prstGeom prst="rect">
               <a:avLst/>
@@ -5913,22 +5919,28 @@
         </p:pic>
         <p:pic>
           <p:nvPicPr>
-            <p:cNvPr id="37" name="Picture 36"/>
+            <p:cNvPr id="56" name="Picture 55"/>
             <p:cNvPicPr>
               <a:picLocks noChangeAspect="1"/>
             </p:cNvPicPr>
             <p:nvPr/>
           </p:nvPicPr>
           <p:blipFill>
-            <a:blip r:embed="rId5"/>
+            <a:blip r:embed="rId5" cstate="print">
+              <a:extLst>
+                <a:ext uri="{28A0092B-C50C-407E-A947-70E740481C1C}">
+                  <a14:useLocalDpi xmlns:a14="http://schemas.microsoft.com/office/drawing/2010/main" val="0"/>
+                </a:ext>
+              </a:extLst>
+            </a:blip>
             <a:stretch>
               <a:fillRect/>
             </a:stretch>
           </p:blipFill>
           <p:spPr>
             <a:xfrm>
-              <a:off x="7606940" y="7198471"/>
-              <a:ext cx="1815660" cy="1556180"/>
+              <a:off x="187274" y="10565733"/>
+              <a:ext cx="1697164" cy="1501981"/>
             </a:xfrm>
             <a:prstGeom prst="rect">
               <a:avLst/>
@@ -5937,28 +5949,28 @@
         </p:pic>
         <p:pic>
           <p:nvPicPr>
-            <p:cNvPr id="21" name="Picture 20">
-              <a:extLst>
-                <a:ext uri="{FF2B5EF4-FFF2-40B4-BE49-F238E27FC236}">
-                  <a16:creationId xmlns:a16="http://schemas.microsoft.com/office/drawing/2014/main" xmlns="" id="{13F0A1E6-029C-42BD-8050-7DCD7C7A3AC6}"/>
-                </a:ext>
-              </a:extLst>
-            </p:cNvPr>
+            <p:cNvPr id="59" name="Picture 58"/>
             <p:cNvPicPr>
               <a:picLocks noChangeAspect="1"/>
             </p:cNvPicPr>
             <p:nvPr/>
           </p:nvPicPr>
           <p:blipFill>
-            <a:blip r:embed="rId6"/>
+            <a:blip r:embed="rId6" cstate="print">
+              <a:extLst>
+                <a:ext uri="{28A0092B-C50C-407E-A947-70E740481C1C}">
+                  <a14:useLocalDpi xmlns:a14="http://schemas.microsoft.com/office/drawing/2010/main" val="0"/>
+                </a:ext>
+              </a:extLst>
+            </a:blip>
             <a:stretch>
               <a:fillRect/>
             </a:stretch>
           </p:blipFill>
           <p:spPr>
             <a:xfrm>
-              <a:off x="5756165" y="8715287"/>
-              <a:ext cx="1861626" cy="1504763"/>
+              <a:off x="1772492" y="9004978"/>
+              <a:ext cx="1697164" cy="1501981"/>
             </a:xfrm>
             <a:prstGeom prst="rect">
               <a:avLst/>
@@ -5967,28 +5979,88 @@
         </p:pic>
         <p:pic>
           <p:nvPicPr>
-            <p:cNvPr id="22" name="Picture 21">
-              <a:extLst>
-                <a:ext uri="{FF2B5EF4-FFF2-40B4-BE49-F238E27FC236}">
-                  <a16:creationId xmlns:a16="http://schemas.microsoft.com/office/drawing/2014/main" xmlns="" id="{79F456E4-257F-43D2-90FC-8D7AD20652A6}"/>
-                </a:ext>
-              </a:extLst>
-            </p:cNvPr>
+            <p:cNvPr id="60" name="Picture 59"/>
             <p:cNvPicPr>
               <a:picLocks noChangeAspect="1"/>
             </p:cNvPicPr>
             <p:nvPr/>
           </p:nvPicPr>
           <p:blipFill>
-            <a:blip r:embed="rId7"/>
+            <a:blip r:embed="rId7" cstate="print">
+              <a:extLst>
+                <a:ext uri="{28A0092B-C50C-407E-A947-70E740481C1C}">
+                  <a14:useLocalDpi xmlns:a14="http://schemas.microsoft.com/office/drawing/2010/main" val="0"/>
+                </a:ext>
+              </a:extLst>
+            </a:blip>
             <a:stretch>
               <a:fillRect/>
             </a:stretch>
           </p:blipFill>
           <p:spPr>
             <a:xfrm>
-              <a:off x="7477422" y="8733675"/>
-              <a:ext cx="1818978" cy="1487859"/>
+              <a:off x="1868090" y="10565328"/>
+              <a:ext cx="1697164" cy="1501981"/>
+            </a:xfrm>
+            <a:prstGeom prst="rect">
+              <a:avLst/>
+            </a:prstGeom>
+          </p:spPr>
+        </p:pic>
+        <p:pic>
+          <p:nvPicPr>
+            <p:cNvPr id="61" name="Picture 60"/>
+            <p:cNvPicPr>
+              <a:picLocks noChangeAspect="1"/>
+            </p:cNvPicPr>
+            <p:nvPr/>
+          </p:nvPicPr>
+          <p:blipFill>
+            <a:blip r:embed="rId8" cstate="print">
+              <a:extLst>
+                <a:ext uri="{28A0092B-C50C-407E-A947-70E740481C1C}">
+                  <a14:useLocalDpi xmlns:a14="http://schemas.microsoft.com/office/drawing/2010/main" val="0"/>
+                </a:ext>
+              </a:extLst>
+            </a:blip>
+            <a:stretch>
+              <a:fillRect/>
+            </a:stretch>
+          </p:blipFill>
+          <p:spPr>
+            <a:xfrm>
+              <a:off x="3418162" y="9004572"/>
+              <a:ext cx="1697164" cy="1501981"/>
+            </a:xfrm>
+            <a:prstGeom prst="rect">
+              <a:avLst/>
+            </a:prstGeom>
+          </p:spPr>
+        </p:pic>
+        <p:pic>
+          <p:nvPicPr>
+            <p:cNvPr id="62" name="Picture 61"/>
+            <p:cNvPicPr>
+              <a:picLocks noChangeAspect="1"/>
+            </p:cNvPicPr>
+            <p:nvPr/>
+          </p:nvPicPr>
+          <p:blipFill>
+            <a:blip r:embed="rId9" cstate="print">
+              <a:extLst>
+                <a:ext uri="{28A0092B-C50C-407E-A947-70E740481C1C}">
+                  <a14:useLocalDpi xmlns:a14="http://schemas.microsoft.com/office/drawing/2010/main" val="0"/>
+                </a:ext>
+              </a:extLst>
+            </a:blip>
+            <a:stretch>
+              <a:fillRect/>
+            </a:stretch>
+          </p:blipFill>
+          <p:spPr>
+            <a:xfrm>
+              <a:off x="3489696" y="10591671"/>
+              <a:ext cx="1697164" cy="1501981"/>
             </a:xfrm>
             <a:prstGeom prst="rect">
               <a:avLst/>
@@ -5997,20 +6069,14 @@
         </p:pic>
         <p:sp>
           <p:nvSpPr>
-            <p:cNvPr id="25" name="TextBox 24">
-              <a:extLst>
-                <a:ext uri="{FF2B5EF4-FFF2-40B4-BE49-F238E27FC236}">
-                  <a16:creationId xmlns:a16="http://schemas.microsoft.com/office/drawing/2014/main" xmlns="" id="{AD6123DE-61B3-46F1-A296-E628EA6BDA66}"/>
-                </a:ext>
-              </a:extLst>
-            </p:cNvPr>
+            <p:cNvPr id="67" name="TextBox 66"/>
             <p:cNvSpPr txBox="1"/>
             <p:nvPr/>
           </p:nvSpPr>
           <p:spPr>
             <a:xfrm>
-              <a:off x="5716427" y="8658395"/>
-              <a:ext cx="291897" cy="268154"/>
+              <a:off x="311684" y="8847134"/>
+              <a:ext cx="133475" cy="261610"/>
             </a:xfrm>
             <a:prstGeom prst="rect">
               <a:avLst/>
@@ -6024,29 +6090,23 @@
             <a:lstStyle/>
             <a:p>
               <a:r>
-                <a:rPr lang="en-AU" sz="1013" dirty="0" smtClean="0"/>
-                <a:t>ii</a:t>
+                <a:rPr lang="en-AU" sz="1100" dirty="0" err="1"/>
+                <a:t>i</a:t>
               </a:r>
-              <a:endParaRPr lang="en-AU" sz="1013" dirty="0"/>
+              <a:endParaRPr lang="en-AU" sz="1200" dirty="0"/>
             </a:p>
           </p:txBody>
         </p:sp>
         <p:sp>
           <p:nvSpPr>
-            <p:cNvPr id="26" name="TextBox 25">
-              <a:extLst>
-                <a:ext uri="{FF2B5EF4-FFF2-40B4-BE49-F238E27FC236}">
-                  <a16:creationId xmlns:a16="http://schemas.microsoft.com/office/drawing/2014/main" xmlns="" id="{AD6123DE-61B3-46F1-A296-E628EA6BDA66}"/>
-                </a:ext>
-              </a:extLst>
-            </p:cNvPr>
+            <p:cNvPr id="68" name="TextBox 67"/>
             <p:cNvSpPr txBox="1"/>
             <p:nvPr/>
           </p:nvSpPr>
           <p:spPr>
             <a:xfrm>
-              <a:off x="7513918" y="8658393"/>
-              <a:ext cx="403088" cy="268154"/>
+              <a:off x="2017933" y="8847134"/>
+              <a:ext cx="467155" cy="261610"/>
             </a:xfrm>
             <a:prstGeom prst="rect">
               <a:avLst/>
@@ -6060,29 +6120,23 @@
             <a:lstStyle/>
             <a:p>
               <a:r>
-                <a:rPr lang="en-AU" sz="1013" dirty="0" smtClean="0"/>
-                <a:t>iv</a:t>
+                <a:rPr lang="en-AU" sz="1100" dirty="0" smtClean="0"/>
+                <a:t>iii</a:t>
               </a:r>
-              <a:endParaRPr lang="en-AU" sz="1013" dirty="0"/>
+              <a:endParaRPr lang="en-AU" sz="1200" dirty="0"/>
             </a:p>
           </p:txBody>
         </p:sp>
         <p:sp>
           <p:nvSpPr>
-            <p:cNvPr id="27" name="TextBox 26">
-              <a:extLst>
-                <a:ext uri="{FF2B5EF4-FFF2-40B4-BE49-F238E27FC236}">
-                  <a16:creationId xmlns:a16="http://schemas.microsoft.com/office/drawing/2014/main" xmlns="" id="{AD6123DE-61B3-46F1-A296-E628EA6BDA66}"/>
-                </a:ext>
-              </a:extLst>
-            </p:cNvPr>
+            <p:cNvPr id="69" name="TextBox 68"/>
             <p:cNvSpPr txBox="1"/>
             <p:nvPr/>
           </p:nvSpPr>
           <p:spPr>
             <a:xfrm>
-              <a:off x="5740354" y="7145240"/>
-              <a:ext cx="468631" cy="268154"/>
+              <a:off x="3689749" y="8847134"/>
+              <a:ext cx="368113" cy="261610"/>
             </a:xfrm>
             <a:prstGeom prst="rect">
               <a:avLst/>
@@ -6096,29 +6150,23 @@
             <a:lstStyle/>
             <a:p>
               <a:r>
-                <a:rPr lang="en-AU" sz="1013" dirty="0" err="1" smtClean="0"/>
-                <a:t>i</a:t>
+                <a:rPr lang="en-AU" sz="1100" dirty="0" smtClean="0"/>
+                <a:t>v</a:t>
               </a:r>
-              <a:endParaRPr lang="en-AU" sz="1013" dirty="0"/>
+              <a:endParaRPr lang="en-AU" sz="1200" dirty="0"/>
             </a:p>
           </p:txBody>
         </p:sp>
         <p:sp>
           <p:nvSpPr>
-            <p:cNvPr id="28" name="TextBox 27">
-              <a:extLst>
-                <a:ext uri="{FF2B5EF4-FFF2-40B4-BE49-F238E27FC236}">
-                  <a16:creationId xmlns:a16="http://schemas.microsoft.com/office/drawing/2014/main" xmlns="" id="{AD6123DE-61B3-46F1-A296-E628EA6BDA66}"/>
-                </a:ext>
-              </a:extLst>
-            </p:cNvPr>
+            <p:cNvPr id="70" name="TextBox 69"/>
             <p:cNvSpPr txBox="1"/>
             <p:nvPr/>
           </p:nvSpPr>
           <p:spPr>
             <a:xfrm>
-              <a:off x="7413646" y="7110667"/>
-              <a:ext cx="337775" cy="268154"/>
+              <a:off x="285154" y="10360287"/>
+              <a:ext cx="277811" cy="261610"/>
             </a:xfrm>
             <a:prstGeom prst="rect">
               <a:avLst/>
@@ -6132,29 +6180,23 @@
             <a:lstStyle/>
             <a:p>
               <a:r>
-                <a:rPr lang="en-AU" sz="1013" dirty="0" smtClean="0"/>
-                <a:t>iii</a:t>
+                <a:rPr lang="en-AU" sz="1100" dirty="0" smtClean="0"/>
+                <a:t>ii</a:t>
               </a:r>
-              <a:endParaRPr lang="en-AU" sz="1013" dirty="0"/>
+              <a:endParaRPr lang="en-AU" sz="1200" dirty="0"/>
             </a:p>
           </p:txBody>
         </p:sp>
         <p:sp>
           <p:nvSpPr>
-            <p:cNvPr id="40" name="TextBox 39">
-              <a:extLst>
-                <a:ext uri="{FF2B5EF4-FFF2-40B4-BE49-F238E27FC236}">
-                  <a16:creationId xmlns:a16="http://schemas.microsoft.com/office/drawing/2014/main" xmlns="" id="{036694F8-822A-4EA9-A83F-BB11CF14A3AC}"/>
-                </a:ext>
-              </a:extLst>
-            </p:cNvPr>
+            <p:cNvPr id="71" name="TextBox 70"/>
             <p:cNvSpPr txBox="1"/>
             <p:nvPr/>
           </p:nvSpPr>
           <p:spPr>
             <a:xfrm>
-              <a:off x="5588938" y="6923208"/>
-              <a:ext cx="222021" cy="299257"/>
+              <a:off x="1958701" y="10360287"/>
+              <a:ext cx="325521" cy="261610"/>
             </a:xfrm>
             <a:prstGeom prst="rect">
               <a:avLst/>
@@ -6168,422 +6210,56 @@
             <a:lstStyle/>
             <a:p>
               <a:r>
-                <a:rPr lang="en-AU" sz="1200" dirty="0" smtClean="0"/>
-                <a:t>d</a:t>
+                <a:rPr lang="en-AU" sz="1100" dirty="0" smtClean="0"/>
+                <a:t>iv</a:t>
+              </a:r>
+              <a:endParaRPr lang="en-AU" sz="1200" dirty="0"/>
+            </a:p>
+          </p:txBody>
+        </p:sp>
+        <p:sp>
+          <p:nvSpPr>
+            <p:cNvPr id="72" name="TextBox 71"/>
+            <p:cNvSpPr txBox="1"/>
+            <p:nvPr/>
+          </p:nvSpPr>
+          <p:spPr>
+            <a:xfrm>
+              <a:off x="3656959" y="10360287"/>
+              <a:ext cx="300810" cy="261610"/>
+            </a:xfrm>
+            <a:prstGeom prst="rect">
+              <a:avLst/>
+            </a:prstGeom>
+            <a:noFill/>
+          </p:spPr>
+          <p:txBody>
+            <a:bodyPr wrap="square" rtlCol="0">
+              <a:spAutoFit/>
+            </a:bodyPr>
+            <a:lstStyle/>
+            <a:p>
+              <a:r>
+                <a:rPr lang="en-AU" sz="1100" dirty="0" smtClean="0"/>
+                <a:t>vi</a:t>
               </a:r>
               <a:endParaRPr lang="en-AU" sz="1200" dirty="0"/>
             </a:p>
           </p:txBody>
         </p:sp>
       </p:grpSp>
-      <p:sp>
-        <p:nvSpPr>
-          <p:cNvPr id="29" name="TextBox 28">
-            <a:extLst>
-              <a:ext uri="{FF2B5EF4-FFF2-40B4-BE49-F238E27FC236}">
-                <a16:creationId xmlns:a16="http://schemas.microsoft.com/office/drawing/2014/main" xmlns="" id="{036694F8-822A-4EA9-A83F-BB11CF14A3AC}"/>
-              </a:ext>
-            </a:extLst>
-          </p:cNvPr>
-          <p:cNvSpPr txBox="1"/>
-          <p:nvPr/>
-        </p:nvSpPr>
-        <p:spPr>
-          <a:xfrm>
-            <a:off x="258497" y="6948209"/>
-            <a:ext cx="205508" cy="276999"/>
-          </a:xfrm>
-          <a:prstGeom prst="rect">
-            <a:avLst/>
-          </a:prstGeom>
-          <a:noFill/>
-        </p:spPr>
-        <p:txBody>
-          <a:bodyPr wrap="square" rtlCol="0">
-            <a:spAutoFit/>
-          </a:bodyPr>
-          <a:lstStyle/>
-          <a:p>
-            <a:r>
-              <a:rPr lang="en-AU" sz="1200" dirty="0" smtClean="0"/>
-              <a:t>b</a:t>
-            </a:r>
-            <a:endParaRPr lang="en-AU" sz="1200" dirty="0"/>
-          </a:p>
-        </p:txBody>
-      </p:sp>
-      <p:pic>
-        <p:nvPicPr>
-          <p:cNvPr id="55" name="Picture 54"/>
-          <p:cNvPicPr>
-            <a:picLocks noChangeAspect="1"/>
-          </p:cNvPicPr>
-          <p:nvPr/>
-        </p:nvPicPr>
-        <p:blipFill>
-          <a:blip r:embed="rId8" cstate="print">
-            <a:extLst>
-              <a:ext uri="{28A0092B-C50C-407E-A947-70E740481C1C}">
-                <a14:useLocalDpi xmlns:a14="http://schemas.microsoft.com/office/drawing/2010/main" val="0"/>
-              </a:ext>
-            </a:extLst>
-          </a:blip>
-          <a:stretch>
-            <a:fillRect/>
-          </a:stretch>
-        </p:blipFill>
-        <p:spPr>
-          <a:xfrm>
-            <a:off x="276753" y="8788714"/>
-            <a:ext cx="1697164" cy="1501981"/>
-          </a:xfrm>
-          <a:prstGeom prst="rect">
-            <a:avLst/>
-          </a:prstGeom>
-        </p:spPr>
-      </p:pic>
-      <p:pic>
-        <p:nvPicPr>
-          <p:cNvPr id="56" name="Picture 55"/>
-          <p:cNvPicPr>
-            <a:picLocks noChangeAspect="1"/>
-          </p:cNvPicPr>
-          <p:nvPr/>
-        </p:nvPicPr>
-        <p:blipFill>
-          <a:blip r:embed="rId9" cstate="print">
-            <a:extLst>
-              <a:ext uri="{28A0092B-C50C-407E-A947-70E740481C1C}">
-                <a14:useLocalDpi xmlns:a14="http://schemas.microsoft.com/office/drawing/2010/main" val="0"/>
-              </a:ext>
-            </a:extLst>
-          </a:blip>
-          <a:stretch>
-            <a:fillRect/>
-          </a:stretch>
-        </p:blipFill>
-        <p:spPr>
-          <a:xfrm>
-            <a:off x="353282" y="7260390"/>
-            <a:ext cx="1697164" cy="1501981"/>
-          </a:xfrm>
-          <a:prstGeom prst="rect">
-            <a:avLst/>
-          </a:prstGeom>
-        </p:spPr>
-      </p:pic>
-      <p:pic>
-        <p:nvPicPr>
-          <p:cNvPr id="59" name="Picture 58"/>
-          <p:cNvPicPr>
-            <a:picLocks noChangeAspect="1"/>
-          </p:cNvPicPr>
-          <p:nvPr/>
-        </p:nvPicPr>
-        <p:blipFill>
-          <a:blip r:embed="rId10" cstate="print">
-            <a:extLst>
-              <a:ext uri="{28A0092B-C50C-407E-A947-70E740481C1C}">
-                <a14:useLocalDpi xmlns:a14="http://schemas.microsoft.com/office/drawing/2010/main" val="0"/>
-              </a:ext>
-            </a:extLst>
-          </a:blip>
-          <a:stretch>
-            <a:fillRect/>
-          </a:stretch>
-        </p:blipFill>
-        <p:spPr>
-          <a:xfrm>
-            <a:off x="1957569" y="8788714"/>
-            <a:ext cx="1697164" cy="1501981"/>
-          </a:xfrm>
-          <a:prstGeom prst="rect">
-            <a:avLst/>
-          </a:prstGeom>
-        </p:spPr>
-      </p:pic>
-      <p:pic>
-        <p:nvPicPr>
-          <p:cNvPr id="60" name="Picture 59"/>
-          <p:cNvPicPr>
-            <a:picLocks noChangeAspect="1"/>
-          </p:cNvPicPr>
-          <p:nvPr/>
-        </p:nvPicPr>
-        <p:blipFill>
-          <a:blip r:embed="rId11" cstate="print">
-            <a:extLst>
-              <a:ext uri="{28A0092B-C50C-407E-A947-70E740481C1C}">
-                <a14:useLocalDpi xmlns:a14="http://schemas.microsoft.com/office/drawing/2010/main" val="0"/>
-              </a:ext>
-            </a:extLst>
-          </a:blip>
-          <a:stretch>
-            <a:fillRect/>
-          </a:stretch>
-        </p:blipFill>
-        <p:spPr>
-          <a:xfrm>
-            <a:off x="2034098" y="7259985"/>
-            <a:ext cx="1697164" cy="1501981"/>
-          </a:xfrm>
-          <a:prstGeom prst="rect">
-            <a:avLst/>
-          </a:prstGeom>
-        </p:spPr>
-      </p:pic>
-      <p:pic>
-        <p:nvPicPr>
-          <p:cNvPr id="61" name="Picture 60"/>
-          <p:cNvPicPr>
-            <a:picLocks noChangeAspect="1"/>
-          </p:cNvPicPr>
-          <p:nvPr/>
-        </p:nvPicPr>
-        <p:blipFill>
-          <a:blip r:embed="rId12" cstate="print">
-            <a:extLst>
-              <a:ext uri="{28A0092B-C50C-407E-A947-70E740481C1C}">
-                <a14:useLocalDpi xmlns:a14="http://schemas.microsoft.com/office/drawing/2010/main" val="0"/>
-              </a:ext>
-            </a:extLst>
-          </a:blip>
-          <a:stretch>
-            <a:fillRect/>
-          </a:stretch>
-        </p:blipFill>
-        <p:spPr>
-          <a:xfrm>
-            <a:off x="3638926" y="8788308"/>
-            <a:ext cx="1697164" cy="1501981"/>
-          </a:xfrm>
-          <a:prstGeom prst="rect">
-            <a:avLst/>
-          </a:prstGeom>
-        </p:spPr>
-      </p:pic>
-      <p:pic>
-        <p:nvPicPr>
-          <p:cNvPr id="62" name="Picture 61"/>
-          <p:cNvPicPr>
-            <a:picLocks noChangeAspect="1"/>
-          </p:cNvPicPr>
-          <p:nvPr/>
-        </p:nvPicPr>
-        <p:blipFill>
-          <a:blip r:embed="rId13" cstate="print">
-            <a:extLst>
-              <a:ext uri="{28A0092B-C50C-407E-A947-70E740481C1C}">
-                <a14:useLocalDpi xmlns:a14="http://schemas.microsoft.com/office/drawing/2010/main" val="0"/>
-              </a:ext>
-            </a:extLst>
-          </a:blip>
-          <a:stretch>
-            <a:fillRect/>
-          </a:stretch>
-        </p:blipFill>
-        <p:spPr>
-          <a:xfrm>
-            <a:off x="3655704" y="7286328"/>
-            <a:ext cx="1697164" cy="1501981"/>
-          </a:xfrm>
-          <a:prstGeom prst="rect">
-            <a:avLst/>
-          </a:prstGeom>
-        </p:spPr>
-      </p:pic>
-      <p:sp>
-        <p:nvSpPr>
-          <p:cNvPr id="67" name="TextBox 66"/>
-          <p:cNvSpPr txBox="1"/>
-          <p:nvPr/>
-        </p:nvSpPr>
-        <p:spPr>
-          <a:xfrm>
-            <a:off x="478505" y="7160481"/>
-            <a:ext cx="133475" cy="261610"/>
-          </a:xfrm>
-          <a:prstGeom prst="rect">
-            <a:avLst/>
-          </a:prstGeom>
-          <a:noFill/>
-        </p:spPr>
-        <p:txBody>
-          <a:bodyPr wrap="square" rtlCol="0">
-            <a:spAutoFit/>
-          </a:bodyPr>
-          <a:lstStyle/>
-          <a:p>
-            <a:r>
-              <a:rPr lang="en-AU" sz="1100" dirty="0" err="1"/>
-              <a:t>i</a:t>
-            </a:r>
-            <a:endParaRPr lang="en-AU" sz="1200" dirty="0"/>
-          </a:p>
-        </p:txBody>
-      </p:sp>
-      <p:sp>
-        <p:nvSpPr>
-          <p:cNvPr id="68" name="TextBox 67"/>
-          <p:cNvSpPr txBox="1"/>
-          <p:nvPr/>
-        </p:nvSpPr>
-        <p:spPr>
-          <a:xfrm>
-            <a:off x="2184754" y="7160481"/>
-            <a:ext cx="467155" cy="261610"/>
-          </a:xfrm>
-          <a:prstGeom prst="rect">
-            <a:avLst/>
-          </a:prstGeom>
-          <a:noFill/>
-        </p:spPr>
-        <p:txBody>
-          <a:bodyPr wrap="square" rtlCol="0">
-            <a:spAutoFit/>
-          </a:bodyPr>
-          <a:lstStyle/>
-          <a:p>
-            <a:r>
-              <a:rPr lang="en-AU" sz="1100" dirty="0" smtClean="0"/>
-              <a:t>iii</a:t>
-            </a:r>
-            <a:endParaRPr lang="en-AU" sz="1200" dirty="0"/>
-          </a:p>
-        </p:txBody>
-      </p:sp>
-      <p:sp>
-        <p:nvSpPr>
-          <p:cNvPr id="69" name="TextBox 68"/>
-          <p:cNvSpPr txBox="1"/>
-          <p:nvPr/>
-        </p:nvSpPr>
-        <p:spPr>
-          <a:xfrm>
-            <a:off x="3856570" y="7160481"/>
-            <a:ext cx="368113" cy="261610"/>
-          </a:xfrm>
-          <a:prstGeom prst="rect">
-            <a:avLst/>
-          </a:prstGeom>
-          <a:noFill/>
-        </p:spPr>
-        <p:txBody>
-          <a:bodyPr wrap="square" rtlCol="0">
-            <a:spAutoFit/>
-          </a:bodyPr>
-          <a:lstStyle/>
-          <a:p>
-            <a:r>
-              <a:rPr lang="en-AU" sz="1100" dirty="0" smtClean="0"/>
-              <a:t>v</a:t>
-            </a:r>
-            <a:endParaRPr lang="en-AU" sz="1200" dirty="0"/>
-          </a:p>
-        </p:txBody>
-      </p:sp>
-      <p:sp>
-        <p:nvSpPr>
-          <p:cNvPr id="70" name="TextBox 69"/>
-          <p:cNvSpPr txBox="1"/>
-          <p:nvPr/>
-        </p:nvSpPr>
-        <p:spPr>
-          <a:xfrm>
-            <a:off x="451975" y="8673634"/>
-            <a:ext cx="277811" cy="261610"/>
-          </a:xfrm>
-          <a:prstGeom prst="rect">
-            <a:avLst/>
-          </a:prstGeom>
-          <a:noFill/>
-        </p:spPr>
-        <p:txBody>
-          <a:bodyPr wrap="square" rtlCol="0">
-            <a:spAutoFit/>
-          </a:bodyPr>
-          <a:lstStyle/>
-          <a:p>
-            <a:r>
-              <a:rPr lang="en-AU" sz="1100" dirty="0" smtClean="0"/>
-              <a:t>ii</a:t>
-            </a:r>
-            <a:endParaRPr lang="en-AU" sz="1200" dirty="0"/>
-          </a:p>
-        </p:txBody>
-      </p:sp>
-      <p:sp>
-        <p:nvSpPr>
-          <p:cNvPr id="71" name="TextBox 70"/>
-          <p:cNvSpPr txBox="1"/>
-          <p:nvPr/>
-        </p:nvSpPr>
-        <p:spPr>
-          <a:xfrm>
-            <a:off x="2125522" y="8673634"/>
-            <a:ext cx="325521" cy="261610"/>
-          </a:xfrm>
-          <a:prstGeom prst="rect">
-            <a:avLst/>
-          </a:prstGeom>
-          <a:noFill/>
-        </p:spPr>
-        <p:txBody>
-          <a:bodyPr wrap="square" rtlCol="0">
-            <a:spAutoFit/>
-          </a:bodyPr>
-          <a:lstStyle/>
-          <a:p>
-            <a:r>
-              <a:rPr lang="en-AU" sz="1100" dirty="0" smtClean="0"/>
-              <a:t>iv</a:t>
-            </a:r>
-            <a:endParaRPr lang="en-AU" sz="1200" dirty="0"/>
-          </a:p>
-        </p:txBody>
-      </p:sp>
-      <p:sp>
-        <p:nvSpPr>
-          <p:cNvPr id="72" name="TextBox 71"/>
-          <p:cNvSpPr txBox="1"/>
-          <p:nvPr/>
-        </p:nvSpPr>
-        <p:spPr>
-          <a:xfrm>
-            <a:off x="3823780" y="8673634"/>
-            <a:ext cx="300810" cy="261610"/>
-          </a:xfrm>
-          <a:prstGeom prst="rect">
-            <a:avLst/>
-          </a:prstGeom>
-          <a:noFill/>
-        </p:spPr>
-        <p:txBody>
-          <a:bodyPr wrap="square" rtlCol="0">
-            <a:spAutoFit/>
-          </a:bodyPr>
-          <a:lstStyle/>
-          <a:p>
-            <a:r>
-              <a:rPr lang="en-AU" sz="1100" dirty="0" smtClean="0"/>
-              <a:t>vi</a:t>
-            </a:r>
-            <a:endParaRPr lang="en-AU" sz="1200" dirty="0"/>
-          </a:p>
-        </p:txBody>
-      </p:sp>
       <p:grpSp>
         <p:nvGrpSpPr>
-          <p:cNvPr id="78" name="Group 77"/>
+          <p:cNvPr id="3" name="Group 2"/>
           <p:cNvGrpSpPr/>
           <p:nvPr/>
         </p:nvGrpSpPr>
         <p:grpSpPr>
           <a:xfrm>
-            <a:off x="5622156" y="2760600"/>
-            <a:ext cx="3556780" cy="3377741"/>
-            <a:chOff x="5519402" y="2824233"/>
-            <a:chExt cx="3556780" cy="3377741"/>
+            <a:off x="5948330" y="6647879"/>
+            <a:ext cx="3483131" cy="3378254"/>
+            <a:chOff x="5984306" y="7028745"/>
+            <a:chExt cx="3483131" cy="3378254"/>
           </a:xfrm>
         </p:grpSpPr>
         <p:sp>
@@ -6591,7 +6267,7 @@
             <p:cNvPr id="39" name="TextBox 38">
               <a:extLst>
                 <a:ext uri="{FF2B5EF4-FFF2-40B4-BE49-F238E27FC236}">
-                  <a16:creationId xmlns:a16="http://schemas.microsoft.com/office/drawing/2014/main" xmlns="" id="{036694F8-822A-4EA9-A83F-BB11CF14A3AC}"/>
+                  <a16:creationId xmlns="" xmlns:a16="http://schemas.microsoft.com/office/drawing/2014/main" id="{036694F8-822A-4EA9-A83F-BB11CF14A3AC}"/>
                 </a:ext>
               </a:extLst>
             </p:cNvPr>
@@ -6600,7 +6276,7 @@
           </p:nvSpPr>
           <p:spPr>
             <a:xfrm>
-              <a:off x="5519402" y="2824233"/>
+              <a:off x="5984306" y="7028745"/>
               <a:ext cx="205508" cy="276999"/>
             </a:xfrm>
             <a:prstGeom prst="rect">
@@ -6621,141 +6297,126 @@
             </a:p>
           </p:txBody>
         </p:sp>
-        <p:grpSp>
-          <p:nvGrpSpPr>
-            <p:cNvPr id="66" name="Group 65"/>
-            <p:cNvGrpSpPr/>
+        <p:pic>
+          <p:nvPicPr>
+            <p:cNvPr id="57" name="Picture 56"/>
+            <p:cNvPicPr>
+              <a:picLocks noChangeAspect="1"/>
+            </p:cNvPicPr>
             <p:nvPr/>
-          </p:nvGrpSpPr>
-          <p:grpSpPr>
+          </p:nvPicPr>
+          <p:blipFill>
+            <a:blip r:embed="rId10" cstate="print">
+              <a:extLst>
+                <a:ext uri="{28A0092B-C50C-407E-A947-70E740481C1C}">
+                  <a14:useLocalDpi xmlns:a14="http://schemas.microsoft.com/office/drawing/2010/main" val="0"/>
+                </a:ext>
+              </a:extLst>
+            </a:blip>
+            <a:stretch>
+              <a:fillRect/>
+            </a:stretch>
+          </p:blipFill>
+          <p:spPr>
             <a:xfrm>
-              <a:off x="5647568" y="3153662"/>
-              <a:ext cx="3428614" cy="3048312"/>
-              <a:chOff x="-7227368" y="6212616"/>
-              <a:chExt cx="4249128" cy="3414995"/>
+              <a:off x="7770273" y="7267005"/>
+              <a:ext cx="1697164" cy="1501981"/>
             </a:xfrm>
-          </p:grpSpPr>
-          <p:pic>
-            <p:nvPicPr>
-              <p:cNvPr id="57" name="Picture 56"/>
-              <p:cNvPicPr>
-                <a:picLocks noChangeAspect="1"/>
-              </p:cNvPicPr>
-              <p:nvPr/>
-            </p:nvPicPr>
-            <p:blipFill>
-              <a:blip r:embed="rId14" cstate="print">
-                <a:extLst>
-                  <a:ext uri="{28A0092B-C50C-407E-A947-70E740481C1C}">
-                    <a14:useLocalDpi xmlns:a14="http://schemas.microsoft.com/office/drawing/2010/main" val="0"/>
-                  </a:ext>
-                </a:extLst>
-              </a:blip>
-              <a:stretch>
-                <a:fillRect/>
-              </a:stretch>
-            </p:blipFill>
-            <p:spPr>
-              <a:xfrm>
-                <a:off x="-5081559" y="7944465"/>
-                <a:ext cx="2103319" cy="1682655"/>
-              </a:xfrm>
-              <a:prstGeom prst="rect">
-                <a:avLst/>
-              </a:prstGeom>
-            </p:spPr>
-          </p:pic>
-          <p:pic>
-            <p:nvPicPr>
-              <p:cNvPr id="58" name="Picture 57"/>
-              <p:cNvPicPr>
-                <a:picLocks noChangeAspect="1"/>
-              </p:cNvPicPr>
-              <p:nvPr/>
-            </p:nvPicPr>
-            <p:blipFill>
-              <a:blip r:embed="rId15" cstate="print">
-                <a:extLst>
-                  <a:ext uri="{28A0092B-C50C-407E-A947-70E740481C1C}">
-                    <a14:useLocalDpi xmlns:a14="http://schemas.microsoft.com/office/drawing/2010/main" val="0"/>
-                  </a:ext>
-                </a:extLst>
-              </a:blip>
-              <a:stretch>
-                <a:fillRect/>
-              </a:stretch>
-            </p:blipFill>
-            <p:spPr>
-              <a:xfrm>
-                <a:off x="-5124048" y="6262301"/>
-                <a:ext cx="2103319" cy="1682655"/>
-              </a:xfrm>
-              <a:prstGeom prst="rect">
-                <a:avLst/>
-              </a:prstGeom>
-            </p:spPr>
-          </p:pic>
-          <p:pic>
-            <p:nvPicPr>
-              <p:cNvPr id="63" name="Picture 62"/>
-              <p:cNvPicPr>
-                <a:picLocks noChangeAspect="1"/>
-              </p:cNvPicPr>
-              <p:nvPr/>
-            </p:nvPicPr>
-            <p:blipFill>
-              <a:blip r:embed="rId16" cstate="print">
-                <a:extLst>
-                  <a:ext uri="{28A0092B-C50C-407E-A947-70E740481C1C}">
-                    <a14:useLocalDpi xmlns:a14="http://schemas.microsoft.com/office/drawing/2010/main" val="0"/>
-                  </a:ext>
-                </a:extLst>
-              </a:blip>
-              <a:stretch>
-                <a:fillRect/>
-              </a:stretch>
-            </p:blipFill>
-            <p:spPr>
-              <a:xfrm>
-                <a:off x="-7227368" y="7944956"/>
-                <a:ext cx="2103319" cy="1682655"/>
-              </a:xfrm>
-              <a:prstGeom prst="rect">
-                <a:avLst/>
-              </a:prstGeom>
-            </p:spPr>
-          </p:pic>
-          <p:pic>
-            <p:nvPicPr>
-              <p:cNvPr id="64" name="Picture 63"/>
-              <p:cNvPicPr>
-                <a:picLocks noChangeAspect="1"/>
-              </p:cNvPicPr>
-              <p:nvPr/>
-            </p:nvPicPr>
-            <p:blipFill>
-              <a:blip r:embed="rId17" cstate="print">
-                <a:extLst>
-                  <a:ext uri="{28A0092B-C50C-407E-A947-70E740481C1C}">
-                    <a14:useLocalDpi xmlns:a14="http://schemas.microsoft.com/office/drawing/2010/main" val="0"/>
-                  </a:ext>
-                </a:extLst>
-              </a:blip>
-              <a:stretch>
-                <a:fillRect/>
-              </a:stretch>
-            </p:blipFill>
-            <p:spPr>
-              <a:xfrm>
-                <a:off x="-7227367" y="6212616"/>
-                <a:ext cx="2103319" cy="1682655"/>
-              </a:xfrm>
-              <a:prstGeom prst="rect">
-                <a:avLst/>
-              </a:prstGeom>
-            </p:spPr>
-          </p:pic>
-        </p:grpSp>
+            <a:prstGeom prst="rect">
+              <a:avLst/>
+            </a:prstGeom>
+          </p:spPr>
+        </p:pic>
+        <p:pic>
+          <p:nvPicPr>
+            <p:cNvPr id="58" name="Picture 57"/>
+            <p:cNvPicPr>
+              <a:picLocks noChangeAspect="1"/>
+            </p:cNvPicPr>
+            <p:nvPr/>
+          </p:nvPicPr>
+          <p:blipFill>
+            <a:blip r:embed="rId11" cstate="print">
+              <a:extLst>
+                <a:ext uri="{28A0092B-C50C-407E-A947-70E740481C1C}">
+                  <a14:useLocalDpi xmlns:a14="http://schemas.microsoft.com/office/drawing/2010/main" val="0"/>
+                </a:ext>
+              </a:extLst>
+            </a:blip>
+            <a:stretch>
+              <a:fillRect/>
+            </a:stretch>
+          </p:blipFill>
+          <p:spPr>
+            <a:xfrm>
+              <a:off x="7766719" y="8905018"/>
+              <a:ext cx="1697164" cy="1501981"/>
+            </a:xfrm>
+            <a:prstGeom prst="rect">
+              <a:avLst/>
+            </a:prstGeom>
+          </p:spPr>
+        </p:pic>
+        <p:pic>
+          <p:nvPicPr>
+            <p:cNvPr id="63" name="Picture 62"/>
+            <p:cNvPicPr>
+              <a:picLocks noChangeAspect="1"/>
+            </p:cNvPicPr>
+            <p:nvPr/>
+          </p:nvPicPr>
+          <p:blipFill>
+            <a:blip r:embed="rId12" cstate="print">
+              <a:extLst>
+                <a:ext uri="{28A0092B-C50C-407E-A947-70E740481C1C}">
+                  <a14:useLocalDpi xmlns:a14="http://schemas.microsoft.com/office/drawing/2010/main" val="0"/>
+                </a:ext>
+              </a:extLst>
+            </a:blip>
+            <a:stretch>
+              <a:fillRect/>
+            </a:stretch>
+          </p:blipFill>
+          <p:spPr>
+            <a:xfrm>
+              <a:off x="6038823" y="7267443"/>
+              <a:ext cx="1697164" cy="1501981"/>
+            </a:xfrm>
+            <a:prstGeom prst="rect">
+              <a:avLst/>
+            </a:prstGeom>
+          </p:spPr>
+        </p:pic>
+        <p:pic>
+          <p:nvPicPr>
+            <p:cNvPr id="64" name="Picture 63"/>
+            <p:cNvPicPr>
+              <a:picLocks noChangeAspect="1"/>
+            </p:cNvPicPr>
+            <p:nvPr/>
+          </p:nvPicPr>
+          <p:blipFill>
+            <a:blip r:embed="rId13" cstate="print">
+              <a:extLst>
+                <a:ext uri="{28A0092B-C50C-407E-A947-70E740481C1C}">
+                  <a14:useLocalDpi xmlns:a14="http://schemas.microsoft.com/office/drawing/2010/main" val="0"/>
+                </a:ext>
+              </a:extLst>
+            </a:blip>
+            <a:stretch>
+              <a:fillRect/>
+            </a:stretch>
+          </p:blipFill>
+          <p:spPr>
+            <a:xfrm>
+              <a:off x="6069555" y="8860668"/>
+              <a:ext cx="1697164" cy="1501981"/>
+            </a:xfrm>
+            <a:prstGeom prst="rect">
+              <a:avLst/>
+            </a:prstGeom>
+          </p:spPr>
+        </p:pic>
         <p:sp>
           <p:nvSpPr>
             <p:cNvPr id="73" name="TextBox 72"/>
@@ -6764,7 +6425,7 @@
           </p:nvSpPr>
           <p:spPr>
             <a:xfrm>
-              <a:off x="5771054" y="3022857"/>
+              <a:off x="6235958" y="7227369"/>
               <a:ext cx="133475" cy="261610"/>
             </a:xfrm>
             <a:prstGeom prst="rect">
@@ -6794,7 +6455,7 @@
           </p:nvSpPr>
           <p:spPr>
             <a:xfrm>
-              <a:off x="7468218" y="3036473"/>
+              <a:off x="7933122" y="7240985"/>
               <a:ext cx="368289" cy="261610"/>
             </a:xfrm>
             <a:prstGeom prst="rect">
@@ -6824,7 +6485,7 @@
           </p:nvSpPr>
           <p:spPr>
             <a:xfrm>
-              <a:off x="5812519" y="4568750"/>
+              <a:off x="6206654" y="8606880"/>
               <a:ext cx="322748" cy="261610"/>
             </a:xfrm>
             <a:prstGeom prst="rect">
@@ -6854,7 +6515,7 @@
           </p:nvSpPr>
           <p:spPr>
             <a:xfrm>
-              <a:off x="7538987" y="4599922"/>
+              <a:off x="7933122" y="8638052"/>
               <a:ext cx="293444" cy="261610"/>
             </a:xfrm>
             <a:prstGeom prst="rect">
@@ -6877,12 +6538,36 @@
           </p:txBody>
         </p:sp>
       </p:grpSp>
+      <p:pic>
+        <p:nvPicPr>
+          <p:cNvPr id="14" name="Picture 13"/>
+          <p:cNvPicPr>
+            <a:picLocks noChangeAspect="1"/>
+          </p:cNvPicPr>
+          <p:nvPr/>
+        </p:nvPicPr>
+        <p:blipFill>
+          <a:blip r:embed="rId14"/>
+          <a:stretch>
+            <a:fillRect/>
+          </a:stretch>
+        </p:blipFill>
+        <p:spPr>
+          <a:xfrm>
+            <a:off x="6939841" y="2633679"/>
+            <a:ext cx="1914609" cy="1497294"/>
+          </a:xfrm>
+          <a:prstGeom prst="rect">
+            <a:avLst/>
+          </a:prstGeom>
+        </p:spPr>
+      </p:pic>
       <p:grpSp>
         <p:nvGrpSpPr>
-          <p:cNvPr id="41" name="Group 40">
+          <p:cNvPr id="81" name="Group 80">
             <a:extLst>
               <a:ext uri="{FF2B5EF4-FFF2-40B4-BE49-F238E27FC236}">
-                <a16:creationId xmlns:a16="http://schemas.microsoft.com/office/drawing/2014/main" xmlns="" id="{334CF8EC-60BE-4F39-9DAB-83E63FCF813B}"/>
+                <a16:creationId xmlns="" xmlns:a16="http://schemas.microsoft.com/office/drawing/2014/main" id="{334CF8EC-60BE-4F39-9DAB-83E63FCF813B}"/>
               </a:ext>
             </a:extLst>
           </p:cNvPr>
@@ -6891,18 +6576,18 @@
         </p:nvGrpSpPr>
         <p:grpSpPr>
           <a:xfrm>
-            <a:off x="943054" y="312588"/>
-            <a:ext cx="2364935" cy="1911897"/>
+            <a:off x="6964650" y="1188358"/>
+            <a:ext cx="1864992" cy="1579701"/>
             <a:chOff x="8328954" y="3313508"/>
             <a:chExt cx="3712734" cy="3091427"/>
           </a:xfrm>
         </p:grpSpPr>
         <p:pic>
           <p:nvPicPr>
-            <p:cNvPr id="42" name="Picture 41">
+            <p:cNvPr id="82" name="Picture 81">
               <a:extLst>
                 <a:ext uri="{FF2B5EF4-FFF2-40B4-BE49-F238E27FC236}">
-                  <a16:creationId xmlns:a16="http://schemas.microsoft.com/office/drawing/2014/main" xmlns="" id="{4DEA67FD-D5A0-4C43-AE8C-3FD531A15958}"/>
+                  <a16:creationId xmlns="" xmlns:a16="http://schemas.microsoft.com/office/drawing/2014/main" id="{4DEA67FD-D5A0-4C43-AE8C-3FD531A15958}"/>
                 </a:ext>
               </a:extLst>
             </p:cNvPr>
@@ -6912,7 +6597,7 @@
             <p:nvPr/>
           </p:nvPicPr>
           <p:blipFill>
-            <a:blip r:embed="rId18"/>
+            <a:blip r:embed="rId15"/>
             <a:stretch>
               <a:fillRect/>
             </a:stretch>
@@ -6929,10 +6614,10 @@
         </p:pic>
         <p:sp>
           <p:nvSpPr>
-            <p:cNvPr id="43" name="TextBox 42">
+            <p:cNvPr id="83" name="TextBox 82">
               <a:extLst>
                 <a:ext uri="{FF2B5EF4-FFF2-40B4-BE49-F238E27FC236}">
-                  <a16:creationId xmlns:a16="http://schemas.microsoft.com/office/drawing/2014/main" xmlns="" id="{8C4EAC27-4656-410C-A78C-43C390974B69}"/>
+                  <a16:creationId xmlns="" xmlns:a16="http://schemas.microsoft.com/office/drawing/2014/main" id="{8C4EAC27-4656-410C-A78C-43C390974B69}"/>
                 </a:ext>
               </a:extLst>
             </p:cNvPr>
@@ -6963,16 +6648,40 @@
           </p:txBody>
         </p:sp>
       </p:grpSp>
-      <p:sp>
-        <p:nvSpPr>
-          <p:cNvPr id="2" name="TextBox 1"/>
+      <p:pic>
+        <p:nvPicPr>
+          <p:cNvPr id="84" name="Picture 83"/>
+          <p:cNvPicPr>
+            <a:picLocks noChangeAspect="1"/>
+          </p:cNvPicPr>
+          <p:nvPr/>
+        </p:nvPicPr>
+        <p:blipFill>
+          <a:blip r:embed="rId16"/>
+          <a:stretch>
+            <a:fillRect/>
+          </a:stretch>
+        </p:blipFill>
+        <p:spPr>
+          <a:xfrm>
+            <a:off x="6937587" y="4122586"/>
+            <a:ext cx="1914609" cy="1523024"/>
+          </a:xfrm>
+          <a:prstGeom prst="rect">
+            <a:avLst/>
+          </a:prstGeom>
+        </p:spPr>
+      </p:pic>
+      <p:sp>
+        <p:nvSpPr>
+          <p:cNvPr id="48" name="TextBox 47"/>
           <p:cNvSpPr txBox="1"/>
           <p:nvPr/>
         </p:nvSpPr>
         <p:spPr>
           <a:xfrm>
-            <a:off x="3934545" y="1034330"/>
-            <a:ext cx="5210106" cy="369332"/>
+            <a:off x="-4298195" y="1532264"/>
+            <a:ext cx="4076700" cy="8679299"/>
           </a:xfrm>
           <a:prstGeom prst="rect">
             <a:avLst/>
@@ -6987,16 +6696,41 @@
           <a:p>
             <a:r>
               <a:rPr lang="en-AU" dirty="0" smtClean="0"/>
-              <a:t>Is there something else we might want to add here?</a:t>
-            </a:r>
+              <a:t>Per leaf area trends in CC’s are essentially identical to environmental trends in leaf protein abundance – strongly driven by temp and rainfall. No strong effect of environment on proportional allocation of CC’s (although some response to irradiance), some evidence that carboxylation capacity per leaf area is increased by increasing LMA, although there </a:t>
+            </a:r>
+            <a:r>
+              <a:rPr lang="en-AU" dirty="0"/>
+              <a:t>is substantial variation in the total protein – LMA relationship, indicating that LMA is responding to other requirements than photosynthetic </a:t>
+            </a:r>
+            <a:r>
+              <a:rPr lang="en-AU" dirty="0" smtClean="0"/>
+              <a:t>capacity.  </a:t>
+            </a:r>
+          </a:p>
+          <a:p>
             <a:endParaRPr lang="en-AU" dirty="0"/>
+          </a:p>
+          <a:p>
+            <a:r>
+              <a:rPr lang="en-AU" dirty="0" smtClean="0"/>
+              <a:t>Patterns in PS are also similar to patterns in total protein, although substantial variability is apparent in protein allocation to light harvesting capacity. Photosystem abundance does not increase on a per leaf area basis as leaves become thicker/denser, and reduces as a proportion of total leaf protein.</a:t>
+            </a:r>
+          </a:p>
+          <a:p>
+            <a:endParaRPr lang="en-AU" dirty="0"/>
+          </a:p>
+          <a:p>
+            <a:r>
+              <a:rPr lang="en-AU" dirty="0" smtClean="0"/>
+              <a:t>Low per leaf area protein abundance at warm, wet sites is more closely associated with low LMA than low protein concentration, while high per leaf area protein abundance at cool, dry sites is strongly associated with high protein concentration.</a:t>
+            </a:r>
           </a:p>
         </p:txBody>
       </p:sp>
     </p:spTree>
     <p:extLst>
       <p:ext uri="{BB962C8B-B14F-4D97-AF65-F5344CB8AC3E}">
-        <p14:creationId xmlns:p14="http://schemas.microsoft.com/office/powerpoint/2010/main" val="1697335192"/>
+        <p14:creationId xmlns:p14="http://schemas.microsoft.com/office/powerpoint/2010/main" val="687445154"/>
       </p:ext>
     </p:extLst>
   </p:cSld>
@@ -7107,7 +6841,7 @@
           <p:cNvPr id="20" name="TextBox 19">
             <a:extLst>
               <a:ext uri="{FF2B5EF4-FFF2-40B4-BE49-F238E27FC236}">
-                <a16:creationId xmlns:a16="http://schemas.microsoft.com/office/drawing/2014/main" xmlns="" id="{036694F8-822A-4EA9-A83F-BB11CF14A3AC}"/>
+                <a16:creationId xmlns="" xmlns:a16="http://schemas.microsoft.com/office/drawing/2014/main" id="{036694F8-822A-4EA9-A83F-BB11CF14A3AC}"/>
               </a:ext>
             </a:extLst>
           </p:cNvPr>
@@ -7196,7 +6930,7 @@
           <p:cNvPr id="37" name="Group 36">
             <a:extLst>
               <a:ext uri="{FF2B5EF4-FFF2-40B4-BE49-F238E27FC236}">
-                <a16:creationId xmlns:a16="http://schemas.microsoft.com/office/drawing/2014/main" xmlns="" id="{334CF8EC-60BE-4F39-9DAB-83E63FCF813B}"/>
+                <a16:creationId xmlns="" xmlns:a16="http://schemas.microsoft.com/office/drawing/2014/main" id="{334CF8EC-60BE-4F39-9DAB-83E63FCF813B}"/>
               </a:ext>
             </a:extLst>
           </p:cNvPr>
@@ -7216,7 +6950,7 @@
             <p:cNvPr id="38" name="Picture 37">
               <a:extLst>
                 <a:ext uri="{FF2B5EF4-FFF2-40B4-BE49-F238E27FC236}">
-                  <a16:creationId xmlns:a16="http://schemas.microsoft.com/office/drawing/2014/main" xmlns="" id="{4DEA67FD-D5A0-4C43-AE8C-3FD531A15958}"/>
+                  <a16:creationId xmlns="" xmlns:a16="http://schemas.microsoft.com/office/drawing/2014/main" id="{4DEA67FD-D5A0-4C43-AE8C-3FD531A15958}"/>
                 </a:ext>
               </a:extLst>
             </p:cNvPr>
@@ -7246,7 +6980,7 @@
             <p:cNvPr id="39" name="TextBox 38">
               <a:extLst>
                 <a:ext uri="{FF2B5EF4-FFF2-40B4-BE49-F238E27FC236}">
-                  <a16:creationId xmlns:a16="http://schemas.microsoft.com/office/drawing/2014/main" xmlns="" id="{8C4EAC27-4656-410C-A78C-43C390974B69}"/>
+                  <a16:creationId xmlns="" xmlns:a16="http://schemas.microsoft.com/office/drawing/2014/main" id="{8C4EAC27-4656-410C-A78C-43C390974B69}"/>
                 </a:ext>
               </a:extLst>
             </p:cNvPr>
@@ -7452,7 +7186,7 @@
           <p:cNvPr id="37" name="Group 36">
             <a:extLst>
               <a:ext uri="{FF2B5EF4-FFF2-40B4-BE49-F238E27FC236}">
-                <a16:creationId xmlns:a16="http://schemas.microsoft.com/office/drawing/2014/main" xmlns="" id="{C9FFF9FF-C604-459E-BA51-CAAD744824C9}"/>
+                <a16:creationId xmlns="" xmlns:a16="http://schemas.microsoft.com/office/drawing/2014/main" id="{C9FFF9FF-C604-459E-BA51-CAAD744824C9}"/>
               </a:ext>
             </a:extLst>
           </p:cNvPr>
@@ -7472,7 +7206,7 @@
             <p:cNvPr id="39" name="Picture 38" descr="abundance_rank_90pc.png">
               <a:extLst>
                 <a:ext uri="{FF2B5EF4-FFF2-40B4-BE49-F238E27FC236}">
-                  <a16:creationId xmlns:a16="http://schemas.microsoft.com/office/drawing/2014/main" xmlns="" id="{34BBFF6D-3CCF-4CB2-B743-963595FCD805}"/>
+                  <a16:creationId xmlns="" xmlns:a16="http://schemas.microsoft.com/office/drawing/2014/main" id="{34BBFF6D-3CCF-4CB2-B743-963595FCD805}"/>
                 </a:ext>
               </a:extLst>
             </p:cNvPr>
@@ -7508,7 +7242,7 @@
             <p:cNvPr id="40" name="TextBox 39">
               <a:extLst>
                 <a:ext uri="{FF2B5EF4-FFF2-40B4-BE49-F238E27FC236}">
-                  <a16:creationId xmlns:a16="http://schemas.microsoft.com/office/drawing/2014/main" xmlns="" id="{589E7152-499C-44E8-BA29-4777970B8AAA}"/>
+                  <a16:creationId xmlns="" xmlns:a16="http://schemas.microsoft.com/office/drawing/2014/main" id="{589E7152-499C-44E8-BA29-4777970B8AAA}"/>
                 </a:ext>
               </a:extLst>
             </p:cNvPr>
@@ -7761,7 +7495,7 @@
             <p:cNvPr id="20" name="TextBox 19">
               <a:extLst>
                 <a:ext uri="{FF2B5EF4-FFF2-40B4-BE49-F238E27FC236}">
-                  <a16:creationId xmlns:a16="http://schemas.microsoft.com/office/drawing/2014/main" xmlns="" id="{036694F8-822A-4EA9-A83F-BB11CF14A3AC}"/>
+                  <a16:creationId xmlns="" xmlns:a16="http://schemas.microsoft.com/office/drawing/2014/main" id="{036694F8-822A-4EA9-A83F-BB11CF14A3AC}"/>
                 </a:ext>
               </a:extLst>
             </p:cNvPr>
@@ -7859,7 +7593,7 @@
             <p:cNvPr id="21" name="Picture 20">
               <a:extLst>
                 <a:ext uri="{FF2B5EF4-FFF2-40B4-BE49-F238E27FC236}">
-                  <a16:creationId xmlns:a16="http://schemas.microsoft.com/office/drawing/2014/main" xmlns="" id="{13F0A1E6-029C-42BD-8050-7DCD7C7A3AC6}"/>
+                  <a16:creationId xmlns="" xmlns:a16="http://schemas.microsoft.com/office/drawing/2014/main" id="{13F0A1E6-029C-42BD-8050-7DCD7C7A3AC6}"/>
                 </a:ext>
               </a:extLst>
             </p:cNvPr>
@@ -7889,7 +7623,7 @@
             <p:cNvPr id="22" name="Picture 21">
               <a:extLst>
                 <a:ext uri="{FF2B5EF4-FFF2-40B4-BE49-F238E27FC236}">
-                  <a16:creationId xmlns:a16="http://schemas.microsoft.com/office/drawing/2014/main" xmlns="" id="{79F456E4-257F-43D2-90FC-8D7AD20652A6}"/>
+                  <a16:creationId xmlns="" xmlns:a16="http://schemas.microsoft.com/office/drawing/2014/main" id="{79F456E4-257F-43D2-90FC-8D7AD20652A6}"/>
                 </a:ext>
               </a:extLst>
             </p:cNvPr>
@@ -7919,7 +7653,7 @@
             <p:cNvPr id="25" name="TextBox 24">
               <a:extLst>
                 <a:ext uri="{FF2B5EF4-FFF2-40B4-BE49-F238E27FC236}">
-                  <a16:creationId xmlns:a16="http://schemas.microsoft.com/office/drawing/2014/main" xmlns="" id="{AD6123DE-61B3-46F1-A296-E628EA6BDA66}"/>
+                  <a16:creationId xmlns="" xmlns:a16="http://schemas.microsoft.com/office/drawing/2014/main" id="{AD6123DE-61B3-46F1-A296-E628EA6BDA66}"/>
                 </a:ext>
               </a:extLst>
             </p:cNvPr>
@@ -7955,7 +7689,7 @@
             <p:cNvPr id="26" name="TextBox 25">
               <a:extLst>
                 <a:ext uri="{FF2B5EF4-FFF2-40B4-BE49-F238E27FC236}">
-                  <a16:creationId xmlns:a16="http://schemas.microsoft.com/office/drawing/2014/main" xmlns="" id="{AD6123DE-61B3-46F1-A296-E628EA6BDA66}"/>
+                  <a16:creationId xmlns="" xmlns:a16="http://schemas.microsoft.com/office/drawing/2014/main" id="{AD6123DE-61B3-46F1-A296-E628EA6BDA66}"/>
                 </a:ext>
               </a:extLst>
             </p:cNvPr>
@@ -7991,7 +7725,7 @@
             <p:cNvPr id="27" name="TextBox 26">
               <a:extLst>
                 <a:ext uri="{FF2B5EF4-FFF2-40B4-BE49-F238E27FC236}">
-                  <a16:creationId xmlns:a16="http://schemas.microsoft.com/office/drawing/2014/main" xmlns="" id="{AD6123DE-61B3-46F1-A296-E628EA6BDA66}"/>
+                  <a16:creationId xmlns="" xmlns:a16="http://schemas.microsoft.com/office/drawing/2014/main" id="{AD6123DE-61B3-46F1-A296-E628EA6BDA66}"/>
                 </a:ext>
               </a:extLst>
             </p:cNvPr>
@@ -8027,7 +7761,7 @@
             <p:cNvPr id="28" name="TextBox 27">
               <a:extLst>
                 <a:ext uri="{FF2B5EF4-FFF2-40B4-BE49-F238E27FC236}">
-                  <a16:creationId xmlns:a16="http://schemas.microsoft.com/office/drawing/2014/main" xmlns="" id="{AD6123DE-61B3-46F1-A296-E628EA6BDA66}"/>
+                  <a16:creationId xmlns="" xmlns:a16="http://schemas.microsoft.com/office/drawing/2014/main" id="{AD6123DE-61B3-46F1-A296-E628EA6BDA66}"/>
                 </a:ext>
               </a:extLst>
             </p:cNvPr>
@@ -8063,7 +7797,7 @@
             <p:cNvPr id="40" name="TextBox 39">
               <a:extLst>
                 <a:ext uri="{FF2B5EF4-FFF2-40B4-BE49-F238E27FC236}">
-                  <a16:creationId xmlns:a16="http://schemas.microsoft.com/office/drawing/2014/main" xmlns="" id="{036694F8-822A-4EA9-A83F-BB11CF14A3AC}"/>
+                  <a16:creationId xmlns="" xmlns:a16="http://schemas.microsoft.com/office/drawing/2014/main" id="{036694F8-822A-4EA9-A83F-BB11CF14A3AC}"/>
                 </a:ext>
               </a:extLst>
             </p:cNvPr>
@@ -8100,7 +7834,7 @@
           <p:cNvPr id="29" name="TextBox 28">
             <a:extLst>
               <a:ext uri="{FF2B5EF4-FFF2-40B4-BE49-F238E27FC236}">
-                <a16:creationId xmlns:a16="http://schemas.microsoft.com/office/drawing/2014/main" xmlns="" id="{036694F8-822A-4EA9-A83F-BB11CF14A3AC}"/>
+                <a16:creationId xmlns="" xmlns:a16="http://schemas.microsoft.com/office/drawing/2014/main" id="{036694F8-822A-4EA9-A83F-BB11CF14A3AC}"/>
               </a:ext>
             </a:extLst>
           </p:cNvPr>
@@ -8510,7 +8244,7 @@
             <p:cNvPr id="39" name="TextBox 38">
               <a:extLst>
                 <a:ext uri="{FF2B5EF4-FFF2-40B4-BE49-F238E27FC236}">
-                  <a16:creationId xmlns:a16="http://schemas.microsoft.com/office/drawing/2014/main" xmlns="" id="{036694F8-822A-4EA9-A83F-BB11CF14A3AC}"/>
+                  <a16:creationId xmlns="" xmlns:a16="http://schemas.microsoft.com/office/drawing/2014/main" id="{036694F8-822A-4EA9-A83F-BB11CF14A3AC}"/>
                 </a:ext>
               </a:extLst>
             </p:cNvPr>

</xml_diff>

<commit_message>
root dir file cleanup and and some adds to manuscript docs
</commit_message>
<xml_diff>
--- a/docs/manuscripts/euc manuscript/figs/euc_MS_figure_panels_JL_27-06-17.pptx
+++ b/docs/manuscripts/euc manuscript/figs/euc_MS_figure_panels_JL_27-06-17.pptx
@@ -206,7 +206,7 @@
           <a:p>
             <a:fld id="{36C24D47-6580-4785-9462-CADD8599AFB8}" type="datetimeFigureOut">
               <a:rPr lang="en-AU" smtClean="0"/>
-              <a:t>3/07/2017</a:t>
+              <a:t>16/08/2017</a:t>
             </a:fld>
             <a:endParaRPr lang="en-AU"/>
           </a:p>
@@ -2668,7 +2668,7 @@
           <a:p>
             <a:fld id="{DBF67EF4-3E3F-41D9-AB59-178FFA85FB21}" type="datetimeFigureOut">
               <a:rPr lang="en-AU" smtClean="0"/>
-              <a:t>3/07/2017</a:t>
+              <a:t>16/08/2017</a:t>
             </a:fld>
             <a:endParaRPr lang="en-AU"/>
           </a:p>
@@ -2838,7 +2838,7 @@
           <a:p>
             <a:fld id="{DBF67EF4-3E3F-41D9-AB59-178FFA85FB21}" type="datetimeFigureOut">
               <a:rPr lang="en-AU" smtClean="0"/>
-              <a:t>3/07/2017</a:t>
+              <a:t>16/08/2017</a:t>
             </a:fld>
             <a:endParaRPr lang="en-AU"/>
           </a:p>
@@ -3018,7 +3018,7 @@
           <a:p>
             <a:fld id="{DBF67EF4-3E3F-41D9-AB59-178FFA85FB21}" type="datetimeFigureOut">
               <a:rPr lang="en-AU" smtClean="0"/>
-              <a:t>3/07/2017</a:t>
+              <a:t>16/08/2017</a:t>
             </a:fld>
             <a:endParaRPr lang="en-AU"/>
           </a:p>
@@ -3188,7 +3188,7 @@
           <a:p>
             <a:fld id="{DBF67EF4-3E3F-41D9-AB59-178FFA85FB21}" type="datetimeFigureOut">
               <a:rPr lang="en-AU" smtClean="0"/>
-              <a:t>3/07/2017</a:t>
+              <a:t>16/08/2017</a:t>
             </a:fld>
             <a:endParaRPr lang="en-AU"/>
           </a:p>
@@ -3432,7 +3432,7 @@
           <a:p>
             <a:fld id="{DBF67EF4-3E3F-41D9-AB59-178FFA85FB21}" type="datetimeFigureOut">
               <a:rPr lang="en-AU" smtClean="0"/>
-              <a:t>3/07/2017</a:t>
+              <a:t>16/08/2017</a:t>
             </a:fld>
             <a:endParaRPr lang="en-AU"/>
           </a:p>
@@ -3664,7 +3664,7 @@
           <a:p>
             <a:fld id="{DBF67EF4-3E3F-41D9-AB59-178FFA85FB21}" type="datetimeFigureOut">
               <a:rPr lang="en-AU" smtClean="0"/>
-              <a:t>3/07/2017</a:t>
+              <a:t>16/08/2017</a:t>
             </a:fld>
             <a:endParaRPr lang="en-AU"/>
           </a:p>
@@ -4031,7 +4031,7 @@
           <a:p>
             <a:fld id="{DBF67EF4-3E3F-41D9-AB59-178FFA85FB21}" type="datetimeFigureOut">
               <a:rPr lang="en-AU" smtClean="0"/>
-              <a:t>3/07/2017</a:t>
+              <a:t>16/08/2017</a:t>
             </a:fld>
             <a:endParaRPr lang="en-AU"/>
           </a:p>
@@ -4149,7 +4149,7 @@
           <a:p>
             <a:fld id="{DBF67EF4-3E3F-41D9-AB59-178FFA85FB21}" type="datetimeFigureOut">
               <a:rPr lang="en-AU" smtClean="0"/>
-              <a:t>3/07/2017</a:t>
+              <a:t>16/08/2017</a:t>
             </a:fld>
             <a:endParaRPr lang="en-AU"/>
           </a:p>
@@ -4244,7 +4244,7 @@
           <a:p>
             <a:fld id="{DBF67EF4-3E3F-41D9-AB59-178FFA85FB21}" type="datetimeFigureOut">
               <a:rPr lang="en-AU" smtClean="0"/>
-              <a:t>3/07/2017</a:t>
+              <a:t>16/08/2017</a:t>
             </a:fld>
             <a:endParaRPr lang="en-AU"/>
           </a:p>
@@ -4521,7 +4521,7 @@
           <a:p>
             <a:fld id="{DBF67EF4-3E3F-41D9-AB59-178FFA85FB21}" type="datetimeFigureOut">
               <a:rPr lang="en-AU" smtClean="0"/>
-              <a:t>3/07/2017</a:t>
+              <a:t>16/08/2017</a:t>
             </a:fld>
             <a:endParaRPr lang="en-AU"/>
           </a:p>
@@ -4778,7 +4778,7 @@
           <a:p>
             <a:fld id="{DBF67EF4-3E3F-41D9-AB59-178FFA85FB21}" type="datetimeFigureOut">
               <a:rPr lang="en-AU" smtClean="0"/>
-              <a:t>3/07/2017</a:t>
+              <a:t>16/08/2017</a:t>
             </a:fld>
             <a:endParaRPr lang="en-AU"/>
           </a:p>
@@ -4991,7 +4991,7 @@
           <a:p>
             <a:fld id="{DBF67EF4-3E3F-41D9-AB59-178FFA85FB21}" type="datetimeFigureOut">
               <a:rPr lang="en-AU" smtClean="0"/>
-              <a:t>3/07/2017</a:t>
+              <a:t>16/08/2017</a:t>
             </a:fld>
             <a:endParaRPr lang="en-AU"/>
           </a:p>
@@ -5401,7 +5401,7 @@
           <p:cNvPr id="20" name="TextBox 19">
             <a:extLst>
               <a:ext uri="{FF2B5EF4-FFF2-40B4-BE49-F238E27FC236}">
-                <a16:creationId xmlns="" xmlns:a16="http://schemas.microsoft.com/office/drawing/2014/main" id="{036694F8-822A-4EA9-A83F-BB11CF14A3AC}"/>
+                <a16:creationId xmlns:a16="http://schemas.microsoft.com/office/drawing/2014/main" id="{036694F8-822A-4EA9-A83F-BB11CF14A3AC}"/>
               </a:ext>
             </a:extLst>
           </p:cNvPr>
@@ -5623,7 +5623,7 @@
           <p:cNvPr id="13" name="Group 12">
             <a:extLst>
               <a:ext uri="{FF2B5EF4-FFF2-40B4-BE49-F238E27FC236}">
-                <a16:creationId xmlns="" xmlns:a16="http://schemas.microsoft.com/office/drawing/2014/main" id="{C9FFF9FF-C604-459E-BA51-CAAD744824C9}"/>
+                <a16:creationId xmlns:a16="http://schemas.microsoft.com/office/drawing/2014/main" id="{C9FFF9FF-C604-459E-BA51-CAAD744824C9}"/>
               </a:ext>
             </a:extLst>
           </p:cNvPr>
@@ -5643,7 +5643,7 @@
             <p:cNvPr id="14" name="Picture 13" descr="abundance_rank_90pc.png">
               <a:extLst>
                 <a:ext uri="{FF2B5EF4-FFF2-40B4-BE49-F238E27FC236}">
-                  <a16:creationId xmlns="" xmlns:a16="http://schemas.microsoft.com/office/drawing/2014/main" id="{34BBFF6D-3CCF-4CB2-B743-963595FCD805}"/>
+                  <a16:creationId xmlns:a16="http://schemas.microsoft.com/office/drawing/2014/main" id="{34BBFF6D-3CCF-4CB2-B743-963595FCD805}"/>
                 </a:ext>
               </a:extLst>
             </p:cNvPr>
@@ -5679,7 +5679,7 @@
             <p:cNvPr id="15" name="TextBox 14">
               <a:extLst>
                 <a:ext uri="{FF2B5EF4-FFF2-40B4-BE49-F238E27FC236}">
-                  <a16:creationId xmlns="" xmlns:a16="http://schemas.microsoft.com/office/drawing/2014/main" id="{589E7152-499C-44E8-BA29-4777970B8AAA}"/>
+                  <a16:creationId xmlns:a16="http://schemas.microsoft.com/office/drawing/2014/main" id="{589E7152-499C-44E8-BA29-4777970B8AAA}"/>
                 </a:ext>
               </a:extLst>
             </p:cNvPr>
@@ -5793,86 +5793,36 @@
           <a:chExt cx="0" cy="0"/>
         </a:xfrm>
       </p:grpSpPr>
-      <p:grpSp>
-        <p:nvGrpSpPr>
-          <p:cNvPr id="19" name="Group 18"/>
-          <p:cNvGrpSpPr/>
+      <p:pic>
+        <p:nvPicPr>
+          <p:cNvPr id="2" name="Picture 1"/>
+          <p:cNvPicPr>
+            <a:picLocks noChangeAspect="1"/>
+          </p:cNvPicPr>
           <p:nvPr/>
-        </p:nvGrpSpPr>
-        <p:grpSpPr>
+        </p:nvPicPr>
+        <p:blipFill>
+          <a:blip r:embed="rId3">
+            <a:extLst>
+              <a:ext uri="{28A0092B-C50C-407E-A947-70E740481C1C}">
+                <a14:useLocalDpi xmlns:a14="http://schemas.microsoft.com/office/drawing/2010/main" val="0"/>
+              </a:ext>
+            </a:extLst>
+          </a:blip>
+          <a:stretch>
+            <a:fillRect/>
+          </a:stretch>
+        </p:blipFill>
+        <p:spPr>
           <a:xfrm>
-            <a:off x="-216980" y="1302147"/>
-            <a:ext cx="6922658" cy="5303173"/>
-            <a:chOff x="-181204" y="2712895"/>
-            <a:chExt cx="4618017" cy="3935116"/>
+            <a:off x="-2622245" y="1041493"/>
+            <a:ext cx="11643046" cy="5563001"/>
           </a:xfrm>
-        </p:grpSpPr>
-        <p:pic>
-          <p:nvPicPr>
-            <p:cNvPr id="6" name="Picture 5"/>
-            <p:cNvPicPr>
-              <a:picLocks noChangeAspect="1"/>
-            </p:cNvPicPr>
-            <p:nvPr/>
-          </p:nvPicPr>
-          <p:blipFill>
-            <a:blip r:embed="rId3">
-              <a:extLst>
-                <a:ext uri="{28A0092B-C50C-407E-A947-70E740481C1C}">
-                  <a14:useLocalDpi xmlns:a14="http://schemas.microsoft.com/office/drawing/2010/main" val="0"/>
-                </a:ext>
-              </a:extLst>
-            </a:blip>
-            <a:stretch>
-              <a:fillRect/>
-            </a:stretch>
-          </p:blipFill>
-          <p:spPr>
-            <a:xfrm>
-              <a:off x="-181204" y="2732519"/>
-              <a:ext cx="4618017" cy="3915492"/>
-            </a:xfrm>
-            <a:prstGeom prst="rect">
-              <a:avLst/>
-            </a:prstGeom>
-          </p:spPr>
-        </p:pic>
-        <p:sp>
-          <p:nvSpPr>
-            <p:cNvPr id="20" name="TextBox 19">
-              <a:extLst>
-                <a:ext uri="{FF2B5EF4-FFF2-40B4-BE49-F238E27FC236}">
-                  <a16:creationId xmlns="" xmlns:a16="http://schemas.microsoft.com/office/drawing/2014/main" id="{036694F8-822A-4EA9-A83F-BB11CF14A3AC}"/>
-                </a:ext>
-              </a:extLst>
-            </p:cNvPr>
-            <p:cNvSpPr txBox="1"/>
-            <p:nvPr/>
-          </p:nvSpPr>
-          <p:spPr>
-            <a:xfrm>
-              <a:off x="506333" y="2712895"/>
-              <a:ext cx="205508" cy="276999"/>
-            </a:xfrm>
-            <a:prstGeom prst="rect">
-              <a:avLst/>
-            </a:prstGeom>
-            <a:noFill/>
-          </p:spPr>
-          <p:txBody>
-            <a:bodyPr wrap="square" rtlCol="0">
-              <a:spAutoFit/>
-            </a:bodyPr>
-            <a:lstStyle/>
-            <a:p>
-              <a:r>
-                <a:rPr lang="en-AU" sz="1200" dirty="0"/>
-                <a:t>a</a:t>
-              </a:r>
-            </a:p>
-          </p:txBody>
-        </p:sp>
-      </p:grpSp>
+          <a:prstGeom prst="rect">
+            <a:avLst/>
+          </a:prstGeom>
+        </p:spPr>
+      </p:pic>
       <p:grpSp>
         <p:nvGrpSpPr>
           <p:cNvPr id="52" name="Group 51"/>
@@ -6267,7 +6217,7 @@
             <p:cNvPr id="39" name="TextBox 38">
               <a:extLst>
                 <a:ext uri="{FF2B5EF4-FFF2-40B4-BE49-F238E27FC236}">
-                  <a16:creationId xmlns="" xmlns:a16="http://schemas.microsoft.com/office/drawing/2014/main" id="{036694F8-822A-4EA9-A83F-BB11CF14A3AC}"/>
+                  <a16:creationId xmlns:a16="http://schemas.microsoft.com/office/drawing/2014/main" id="{036694F8-822A-4EA9-A83F-BB11CF14A3AC}"/>
                 </a:ext>
               </a:extLst>
             </p:cNvPr>
@@ -6567,7 +6517,7 @@
           <p:cNvPr id="81" name="Group 80">
             <a:extLst>
               <a:ext uri="{FF2B5EF4-FFF2-40B4-BE49-F238E27FC236}">
-                <a16:creationId xmlns="" xmlns:a16="http://schemas.microsoft.com/office/drawing/2014/main" id="{334CF8EC-60BE-4F39-9DAB-83E63FCF813B}"/>
+                <a16:creationId xmlns:a16="http://schemas.microsoft.com/office/drawing/2014/main" id="{334CF8EC-60BE-4F39-9DAB-83E63FCF813B}"/>
               </a:ext>
             </a:extLst>
           </p:cNvPr>
@@ -6587,7 +6537,7 @@
             <p:cNvPr id="82" name="Picture 81">
               <a:extLst>
                 <a:ext uri="{FF2B5EF4-FFF2-40B4-BE49-F238E27FC236}">
-                  <a16:creationId xmlns="" xmlns:a16="http://schemas.microsoft.com/office/drawing/2014/main" id="{4DEA67FD-D5A0-4C43-AE8C-3FD531A15958}"/>
+                  <a16:creationId xmlns:a16="http://schemas.microsoft.com/office/drawing/2014/main" id="{4DEA67FD-D5A0-4C43-AE8C-3FD531A15958}"/>
                 </a:ext>
               </a:extLst>
             </p:cNvPr>
@@ -6617,7 +6567,7 @@
             <p:cNvPr id="83" name="TextBox 82">
               <a:extLst>
                 <a:ext uri="{FF2B5EF4-FFF2-40B4-BE49-F238E27FC236}">
-                  <a16:creationId xmlns="" xmlns:a16="http://schemas.microsoft.com/office/drawing/2014/main" id="{8C4EAC27-4656-410C-A78C-43C390974B69}"/>
+                  <a16:creationId xmlns:a16="http://schemas.microsoft.com/office/drawing/2014/main" id="{8C4EAC27-4656-410C-A78C-43C390974B69}"/>
                 </a:ext>
               </a:extLst>
             </p:cNvPr>
@@ -6841,7 +6791,7 @@
           <p:cNvPr id="20" name="TextBox 19">
             <a:extLst>
               <a:ext uri="{FF2B5EF4-FFF2-40B4-BE49-F238E27FC236}">
-                <a16:creationId xmlns="" xmlns:a16="http://schemas.microsoft.com/office/drawing/2014/main" id="{036694F8-822A-4EA9-A83F-BB11CF14A3AC}"/>
+                <a16:creationId xmlns:a16="http://schemas.microsoft.com/office/drawing/2014/main" id="{036694F8-822A-4EA9-A83F-BB11CF14A3AC}"/>
               </a:ext>
             </a:extLst>
           </p:cNvPr>
@@ -6930,7 +6880,7 @@
           <p:cNvPr id="37" name="Group 36">
             <a:extLst>
               <a:ext uri="{FF2B5EF4-FFF2-40B4-BE49-F238E27FC236}">
-                <a16:creationId xmlns="" xmlns:a16="http://schemas.microsoft.com/office/drawing/2014/main" id="{334CF8EC-60BE-4F39-9DAB-83E63FCF813B}"/>
+                <a16:creationId xmlns:a16="http://schemas.microsoft.com/office/drawing/2014/main" id="{334CF8EC-60BE-4F39-9DAB-83E63FCF813B}"/>
               </a:ext>
             </a:extLst>
           </p:cNvPr>
@@ -6950,7 +6900,7 @@
             <p:cNvPr id="38" name="Picture 37">
               <a:extLst>
                 <a:ext uri="{FF2B5EF4-FFF2-40B4-BE49-F238E27FC236}">
-                  <a16:creationId xmlns="" xmlns:a16="http://schemas.microsoft.com/office/drawing/2014/main" id="{4DEA67FD-D5A0-4C43-AE8C-3FD531A15958}"/>
+                  <a16:creationId xmlns:a16="http://schemas.microsoft.com/office/drawing/2014/main" id="{4DEA67FD-D5A0-4C43-AE8C-3FD531A15958}"/>
                 </a:ext>
               </a:extLst>
             </p:cNvPr>
@@ -6980,7 +6930,7 @@
             <p:cNvPr id="39" name="TextBox 38">
               <a:extLst>
                 <a:ext uri="{FF2B5EF4-FFF2-40B4-BE49-F238E27FC236}">
-                  <a16:creationId xmlns="" xmlns:a16="http://schemas.microsoft.com/office/drawing/2014/main" id="{8C4EAC27-4656-410C-A78C-43C390974B69}"/>
+                  <a16:creationId xmlns:a16="http://schemas.microsoft.com/office/drawing/2014/main" id="{8C4EAC27-4656-410C-A78C-43C390974B69}"/>
                 </a:ext>
               </a:extLst>
             </p:cNvPr>
@@ -7186,7 +7136,7 @@
           <p:cNvPr id="37" name="Group 36">
             <a:extLst>
               <a:ext uri="{FF2B5EF4-FFF2-40B4-BE49-F238E27FC236}">
-                <a16:creationId xmlns="" xmlns:a16="http://schemas.microsoft.com/office/drawing/2014/main" id="{C9FFF9FF-C604-459E-BA51-CAAD744824C9}"/>
+                <a16:creationId xmlns:a16="http://schemas.microsoft.com/office/drawing/2014/main" id="{C9FFF9FF-C604-459E-BA51-CAAD744824C9}"/>
               </a:ext>
             </a:extLst>
           </p:cNvPr>
@@ -7206,7 +7156,7 @@
             <p:cNvPr id="39" name="Picture 38" descr="abundance_rank_90pc.png">
               <a:extLst>
                 <a:ext uri="{FF2B5EF4-FFF2-40B4-BE49-F238E27FC236}">
-                  <a16:creationId xmlns="" xmlns:a16="http://schemas.microsoft.com/office/drawing/2014/main" id="{34BBFF6D-3CCF-4CB2-B743-963595FCD805}"/>
+                  <a16:creationId xmlns:a16="http://schemas.microsoft.com/office/drawing/2014/main" id="{34BBFF6D-3CCF-4CB2-B743-963595FCD805}"/>
                 </a:ext>
               </a:extLst>
             </p:cNvPr>
@@ -7242,7 +7192,7 @@
             <p:cNvPr id="40" name="TextBox 39">
               <a:extLst>
                 <a:ext uri="{FF2B5EF4-FFF2-40B4-BE49-F238E27FC236}">
-                  <a16:creationId xmlns="" xmlns:a16="http://schemas.microsoft.com/office/drawing/2014/main" id="{589E7152-499C-44E8-BA29-4777970B8AAA}"/>
+                  <a16:creationId xmlns:a16="http://schemas.microsoft.com/office/drawing/2014/main" id="{589E7152-499C-44E8-BA29-4777970B8AAA}"/>
                 </a:ext>
               </a:extLst>
             </p:cNvPr>
@@ -7495,7 +7445,7 @@
             <p:cNvPr id="20" name="TextBox 19">
               <a:extLst>
                 <a:ext uri="{FF2B5EF4-FFF2-40B4-BE49-F238E27FC236}">
-                  <a16:creationId xmlns="" xmlns:a16="http://schemas.microsoft.com/office/drawing/2014/main" id="{036694F8-822A-4EA9-A83F-BB11CF14A3AC}"/>
+                  <a16:creationId xmlns:a16="http://schemas.microsoft.com/office/drawing/2014/main" id="{036694F8-822A-4EA9-A83F-BB11CF14A3AC}"/>
                 </a:ext>
               </a:extLst>
             </p:cNvPr>
@@ -7593,7 +7543,7 @@
             <p:cNvPr id="21" name="Picture 20">
               <a:extLst>
                 <a:ext uri="{FF2B5EF4-FFF2-40B4-BE49-F238E27FC236}">
-                  <a16:creationId xmlns="" xmlns:a16="http://schemas.microsoft.com/office/drawing/2014/main" id="{13F0A1E6-029C-42BD-8050-7DCD7C7A3AC6}"/>
+                  <a16:creationId xmlns:a16="http://schemas.microsoft.com/office/drawing/2014/main" id="{13F0A1E6-029C-42BD-8050-7DCD7C7A3AC6}"/>
                 </a:ext>
               </a:extLst>
             </p:cNvPr>
@@ -7623,7 +7573,7 @@
             <p:cNvPr id="22" name="Picture 21">
               <a:extLst>
                 <a:ext uri="{FF2B5EF4-FFF2-40B4-BE49-F238E27FC236}">
-                  <a16:creationId xmlns="" xmlns:a16="http://schemas.microsoft.com/office/drawing/2014/main" id="{79F456E4-257F-43D2-90FC-8D7AD20652A6}"/>
+                  <a16:creationId xmlns:a16="http://schemas.microsoft.com/office/drawing/2014/main" id="{79F456E4-257F-43D2-90FC-8D7AD20652A6}"/>
                 </a:ext>
               </a:extLst>
             </p:cNvPr>
@@ -7653,7 +7603,7 @@
             <p:cNvPr id="25" name="TextBox 24">
               <a:extLst>
                 <a:ext uri="{FF2B5EF4-FFF2-40B4-BE49-F238E27FC236}">
-                  <a16:creationId xmlns="" xmlns:a16="http://schemas.microsoft.com/office/drawing/2014/main" id="{AD6123DE-61B3-46F1-A296-E628EA6BDA66}"/>
+                  <a16:creationId xmlns:a16="http://schemas.microsoft.com/office/drawing/2014/main" id="{AD6123DE-61B3-46F1-A296-E628EA6BDA66}"/>
                 </a:ext>
               </a:extLst>
             </p:cNvPr>
@@ -7689,7 +7639,7 @@
             <p:cNvPr id="26" name="TextBox 25">
               <a:extLst>
                 <a:ext uri="{FF2B5EF4-FFF2-40B4-BE49-F238E27FC236}">
-                  <a16:creationId xmlns="" xmlns:a16="http://schemas.microsoft.com/office/drawing/2014/main" id="{AD6123DE-61B3-46F1-A296-E628EA6BDA66}"/>
+                  <a16:creationId xmlns:a16="http://schemas.microsoft.com/office/drawing/2014/main" id="{AD6123DE-61B3-46F1-A296-E628EA6BDA66}"/>
                 </a:ext>
               </a:extLst>
             </p:cNvPr>
@@ -7725,7 +7675,7 @@
             <p:cNvPr id="27" name="TextBox 26">
               <a:extLst>
                 <a:ext uri="{FF2B5EF4-FFF2-40B4-BE49-F238E27FC236}">
-                  <a16:creationId xmlns="" xmlns:a16="http://schemas.microsoft.com/office/drawing/2014/main" id="{AD6123DE-61B3-46F1-A296-E628EA6BDA66}"/>
+                  <a16:creationId xmlns:a16="http://schemas.microsoft.com/office/drawing/2014/main" id="{AD6123DE-61B3-46F1-A296-E628EA6BDA66}"/>
                 </a:ext>
               </a:extLst>
             </p:cNvPr>
@@ -7761,7 +7711,7 @@
             <p:cNvPr id="28" name="TextBox 27">
               <a:extLst>
                 <a:ext uri="{FF2B5EF4-FFF2-40B4-BE49-F238E27FC236}">
-                  <a16:creationId xmlns="" xmlns:a16="http://schemas.microsoft.com/office/drawing/2014/main" id="{AD6123DE-61B3-46F1-A296-E628EA6BDA66}"/>
+                  <a16:creationId xmlns:a16="http://schemas.microsoft.com/office/drawing/2014/main" id="{AD6123DE-61B3-46F1-A296-E628EA6BDA66}"/>
                 </a:ext>
               </a:extLst>
             </p:cNvPr>
@@ -7797,7 +7747,7 @@
             <p:cNvPr id="40" name="TextBox 39">
               <a:extLst>
                 <a:ext uri="{FF2B5EF4-FFF2-40B4-BE49-F238E27FC236}">
-                  <a16:creationId xmlns="" xmlns:a16="http://schemas.microsoft.com/office/drawing/2014/main" id="{036694F8-822A-4EA9-A83F-BB11CF14A3AC}"/>
+                  <a16:creationId xmlns:a16="http://schemas.microsoft.com/office/drawing/2014/main" id="{036694F8-822A-4EA9-A83F-BB11CF14A3AC}"/>
                 </a:ext>
               </a:extLst>
             </p:cNvPr>
@@ -7834,7 +7784,7 @@
           <p:cNvPr id="29" name="TextBox 28">
             <a:extLst>
               <a:ext uri="{FF2B5EF4-FFF2-40B4-BE49-F238E27FC236}">
-                <a16:creationId xmlns="" xmlns:a16="http://schemas.microsoft.com/office/drawing/2014/main" id="{036694F8-822A-4EA9-A83F-BB11CF14A3AC}"/>
+                <a16:creationId xmlns:a16="http://schemas.microsoft.com/office/drawing/2014/main" id="{036694F8-822A-4EA9-A83F-BB11CF14A3AC}"/>
               </a:ext>
             </a:extLst>
           </p:cNvPr>
@@ -8244,7 +8194,7 @@
             <p:cNvPr id="39" name="TextBox 38">
               <a:extLst>
                 <a:ext uri="{FF2B5EF4-FFF2-40B4-BE49-F238E27FC236}">
-                  <a16:creationId xmlns="" xmlns:a16="http://schemas.microsoft.com/office/drawing/2014/main" id="{036694F8-822A-4EA9-A83F-BB11CF14A3AC}"/>
+                  <a16:creationId xmlns:a16="http://schemas.microsoft.com/office/drawing/2014/main" id="{036694F8-822A-4EA9-A83F-BB11CF14A3AC}"/>
                 </a:ext>
               </a:extLst>
             </p:cNvPr>

</xml_diff>